<commit_message>
presentation slides of Physiolibrary 2.1 paper for Medsoft 2014 conference conversion scripts from previous versions fix: start conditions of model prepared for steady state with non-steady state setting
</commit_message>
<xml_diff>
--- a/Physiolibrary/Resources/Documentation/Physiolibrary v2.1.pptx
+++ b/Physiolibrary/Resources/Documentation/Physiolibrary v2.1.pptx
@@ -7,20 +7,24 @@
   <p:sldIdLst>
     <p:sldId id="256" r:id="rId2"/>
     <p:sldId id="260" r:id="rId3"/>
-    <p:sldId id="258" r:id="rId4"/>
-    <p:sldId id="259" r:id="rId5"/>
-    <p:sldId id="263" r:id="rId6"/>
-    <p:sldId id="261" r:id="rId7"/>
-    <p:sldId id="262" r:id="rId8"/>
-    <p:sldId id="264" r:id="rId9"/>
-    <p:sldId id="266" r:id="rId10"/>
-    <p:sldId id="271" r:id="rId11"/>
-    <p:sldId id="275" r:id="rId12"/>
-    <p:sldId id="277" r:id="rId13"/>
-    <p:sldId id="272" r:id="rId14"/>
-    <p:sldId id="273" r:id="rId15"/>
-    <p:sldId id="274" r:id="rId16"/>
-    <p:sldId id="276" r:id="rId17"/>
+    <p:sldId id="284" r:id="rId4"/>
+    <p:sldId id="285" r:id="rId5"/>
+    <p:sldId id="258" r:id="rId6"/>
+    <p:sldId id="259" r:id="rId7"/>
+    <p:sldId id="263" r:id="rId8"/>
+    <p:sldId id="283" r:id="rId9"/>
+    <p:sldId id="264" r:id="rId10"/>
+    <p:sldId id="282" r:id="rId11"/>
+    <p:sldId id="278" r:id="rId12"/>
+    <p:sldId id="279" r:id="rId13"/>
+    <p:sldId id="281" r:id="rId14"/>
+    <p:sldId id="275" r:id="rId15"/>
+    <p:sldId id="271" r:id="rId16"/>
+    <p:sldId id="277" r:id="rId17"/>
+    <p:sldId id="274" r:id="rId18"/>
+    <p:sldId id="272" r:id="rId19"/>
+    <p:sldId id="273" r:id="rId20"/>
+    <p:sldId id="276" r:id="rId21"/>
   </p:sldIdLst>
   <p:sldSz cx="9144000" cy="6858000" type="screen4x3"/>
   <p:notesSz cx="6858000" cy="9144000"/>
@@ -304,7 +308,7 @@
             <a:fld id="{18A2481B-5154-415F-B752-558547769AA3}" type="datetimeFigureOut">
               <a:rPr lang="cs-CZ" smtClean="0"/>
               <a:pPr/>
-              <a:t>5. 3. 2014</a:t>
+              <a:t>11. 3. 2014</a:t>
             </a:fld>
             <a:endParaRPr lang="cs-CZ"/>
           </a:p>
@@ -471,7 +475,7 @@
             <a:fld id="{18A2481B-5154-415F-B752-558547769AA3}" type="datetimeFigureOut">
               <a:rPr lang="cs-CZ" smtClean="0"/>
               <a:pPr/>
-              <a:t>5. 3. 2014</a:t>
+              <a:t>11. 3. 2014</a:t>
             </a:fld>
             <a:endParaRPr lang="cs-CZ"/>
           </a:p>
@@ -648,7 +652,7 @@
             <a:fld id="{18A2481B-5154-415F-B752-558547769AA3}" type="datetimeFigureOut">
               <a:rPr lang="cs-CZ" smtClean="0"/>
               <a:pPr/>
-              <a:t>5. 3. 2014</a:t>
+              <a:t>11. 3. 2014</a:t>
             </a:fld>
             <a:endParaRPr lang="cs-CZ"/>
           </a:p>
@@ -815,7 +819,7 @@
             <a:fld id="{18A2481B-5154-415F-B752-558547769AA3}" type="datetimeFigureOut">
               <a:rPr lang="cs-CZ" smtClean="0"/>
               <a:pPr/>
-              <a:t>5. 3. 2014</a:t>
+              <a:t>11. 3. 2014</a:t>
             </a:fld>
             <a:endParaRPr lang="cs-CZ"/>
           </a:p>
@@ -1058,7 +1062,7 @@
             <a:fld id="{18A2481B-5154-415F-B752-558547769AA3}" type="datetimeFigureOut">
               <a:rPr lang="cs-CZ" smtClean="0"/>
               <a:pPr/>
-              <a:t>5. 3. 2014</a:t>
+              <a:t>11. 3. 2014</a:t>
             </a:fld>
             <a:endParaRPr lang="cs-CZ"/>
           </a:p>
@@ -1343,7 +1347,7 @@
             <a:fld id="{18A2481B-5154-415F-B752-558547769AA3}" type="datetimeFigureOut">
               <a:rPr lang="cs-CZ" smtClean="0"/>
               <a:pPr/>
-              <a:t>5. 3. 2014</a:t>
+              <a:t>11. 3. 2014</a:t>
             </a:fld>
             <a:endParaRPr lang="cs-CZ"/>
           </a:p>
@@ -1762,7 +1766,7 @@
             <a:fld id="{18A2481B-5154-415F-B752-558547769AA3}" type="datetimeFigureOut">
               <a:rPr lang="cs-CZ" smtClean="0"/>
               <a:pPr/>
-              <a:t>5. 3. 2014</a:t>
+              <a:t>11. 3. 2014</a:t>
             </a:fld>
             <a:endParaRPr lang="cs-CZ"/>
           </a:p>
@@ -1877,7 +1881,7 @@
             <a:fld id="{18A2481B-5154-415F-B752-558547769AA3}" type="datetimeFigureOut">
               <a:rPr lang="cs-CZ" smtClean="0"/>
               <a:pPr/>
-              <a:t>5. 3. 2014</a:t>
+              <a:t>11. 3. 2014</a:t>
             </a:fld>
             <a:endParaRPr lang="cs-CZ"/>
           </a:p>
@@ -1969,7 +1973,7 @@
             <a:fld id="{18A2481B-5154-415F-B752-558547769AA3}" type="datetimeFigureOut">
               <a:rPr lang="cs-CZ" smtClean="0"/>
               <a:pPr/>
-              <a:t>5. 3. 2014</a:t>
+              <a:t>11. 3. 2014</a:t>
             </a:fld>
             <a:endParaRPr lang="cs-CZ"/>
           </a:p>
@@ -2243,7 +2247,7 @@
             <a:fld id="{18A2481B-5154-415F-B752-558547769AA3}" type="datetimeFigureOut">
               <a:rPr lang="cs-CZ" smtClean="0"/>
               <a:pPr/>
-              <a:t>5. 3. 2014</a:t>
+              <a:t>11. 3. 2014</a:t>
             </a:fld>
             <a:endParaRPr lang="cs-CZ"/>
           </a:p>
@@ -2493,7 +2497,7 @@
             <a:fld id="{18A2481B-5154-415F-B752-558547769AA3}" type="datetimeFigureOut">
               <a:rPr lang="cs-CZ" smtClean="0"/>
               <a:pPr/>
-              <a:t>5. 3. 2014</a:t>
+              <a:t>11. 3. 2014</a:t>
             </a:fld>
             <a:endParaRPr lang="cs-CZ"/>
           </a:p>
@@ -2703,7 +2707,7 @@
             <a:fld id="{18A2481B-5154-415F-B752-558547769AA3}" type="datetimeFigureOut">
               <a:rPr lang="cs-CZ" smtClean="0"/>
               <a:pPr/>
-              <a:t>5. 3. 2014</a:t>
+              <a:t>11. 3. 2014</a:t>
             </a:fld>
             <a:endParaRPr lang="cs-CZ"/>
           </a:p>
@@ -3125,10 +3129,1340 @@
   <p:clrMapOvr>
     <a:masterClrMapping/>
   </p:clrMapOvr>
+  <p:timing>
+    <p:tnLst>
+      <p:par>
+        <p:cTn id="1" dur="indefinite" restart="never" nodeType="tmRoot"/>
+      </p:par>
+    </p:tnLst>
+  </p:timing>
 </p:sld>
 </file>
 
 <file path=ppt/slides/slide10.xml><?xml version="1.0" encoding="utf-8"?>
+<p:sld xmlns:a="http://schemas.openxmlformats.org/drawingml/2006/main" xmlns:r="http://schemas.openxmlformats.org/officeDocument/2006/relationships" xmlns:p="http://schemas.openxmlformats.org/presentationml/2006/main">
+  <p:cSld>
+    <p:spTree>
+      <p:nvGrpSpPr>
+        <p:cNvPr id="1" name=""/>
+        <p:cNvGrpSpPr/>
+        <p:nvPr/>
+      </p:nvGrpSpPr>
+      <p:grpSpPr>
+        <a:xfrm>
+          <a:off x="0" y="0"/>
+          <a:ext cx="0" cy="0"/>
+          <a:chOff x="0" y="0"/>
+          <a:chExt cx="0" cy="0"/>
+        </a:xfrm>
+      </p:grpSpPr>
+      <p:pic>
+        <p:nvPicPr>
+          <p:cNvPr id="7181" name="Picture 13"/>
+          <p:cNvPicPr>
+            <a:picLocks noChangeAspect="1" noChangeArrowheads="1"/>
+          </p:cNvPicPr>
+          <p:nvPr/>
+        </p:nvPicPr>
+        <p:blipFill>
+          <a:blip r:embed="rId2" cstate="print"/>
+          <a:srcRect/>
+          <a:stretch>
+            <a:fillRect/>
+          </a:stretch>
+        </p:blipFill>
+        <p:spPr bwMode="auto">
+          <a:xfrm>
+            <a:off x="7596336" y="1432570"/>
+            <a:ext cx="1257300" cy="1276350"/>
+          </a:xfrm>
+          <a:prstGeom prst="rect">
+            <a:avLst/>
+          </a:prstGeom>
+          <a:noFill/>
+          <a:ln w="9525">
+            <a:noFill/>
+            <a:miter lim="800000"/>
+            <a:headEnd/>
+            <a:tailEnd/>
+          </a:ln>
+        </p:spPr>
+      </p:pic>
+      <p:sp>
+        <p:nvSpPr>
+          <p:cNvPr id="2" name="Nadpis 1"/>
+          <p:cNvSpPr>
+            <a:spLocks noGrp="1"/>
+          </p:cNvSpPr>
+          <p:nvPr>
+            <p:ph type="title"/>
+          </p:nvPr>
+        </p:nvSpPr>
+        <p:spPr/>
+        <p:txBody>
+          <a:bodyPr/>
+          <a:lstStyle/>
+          <a:p>
+            <a:r>
+              <a:rPr lang="en-US" dirty="0" smtClean="0"/>
+              <a:t>CONDITIONAL INPUTS</a:t>
+            </a:r>
+            <a:endParaRPr lang="cs-CZ" dirty="0"/>
+          </a:p>
+        </p:txBody>
+      </p:sp>
+      <p:pic>
+        <p:nvPicPr>
+          <p:cNvPr id="7170" name="Picture 2"/>
+          <p:cNvPicPr>
+            <a:picLocks noChangeAspect="1" noChangeArrowheads="1"/>
+          </p:cNvPicPr>
+          <p:nvPr/>
+        </p:nvPicPr>
+        <p:blipFill>
+          <a:blip r:embed="rId3" cstate="print"/>
+          <a:srcRect/>
+          <a:stretch>
+            <a:fillRect/>
+          </a:stretch>
+        </p:blipFill>
+        <p:spPr bwMode="auto">
+          <a:xfrm>
+            <a:off x="2972941" y="1490861"/>
+            <a:ext cx="1743075" cy="1362075"/>
+          </a:xfrm>
+          <a:prstGeom prst="rect">
+            <a:avLst/>
+          </a:prstGeom>
+          <a:noFill/>
+          <a:ln w="9525">
+            <a:noFill/>
+            <a:miter lim="800000"/>
+            <a:headEnd/>
+            <a:tailEnd/>
+          </a:ln>
+        </p:spPr>
+      </p:pic>
+      <p:pic>
+        <p:nvPicPr>
+          <p:cNvPr id="7173" name="Picture 5"/>
+          <p:cNvPicPr>
+            <a:picLocks noChangeAspect="1" noChangeArrowheads="1"/>
+          </p:cNvPicPr>
+          <p:nvPr/>
+        </p:nvPicPr>
+        <p:blipFill>
+          <a:blip r:embed="rId4" cstate="print"/>
+          <a:srcRect/>
+          <a:stretch>
+            <a:fillRect/>
+          </a:stretch>
+        </p:blipFill>
+        <p:spPr bwMode="auto">
+          <a:xfrm>
+            <a:off x="345157" y="1556792"/>
+            <a:ext cx="2438400" cy="723900"/>
+          </a:xfrm>
+          <a:prstGeom prst="rect">
+            <a:avLst/>
+          </a:prstGeom>
+          <a:noFill/>
+          <a:ln w="9525">
+            <a:noFill/>
+            <a:miter lim="800000"/>
+            <a:headEnd/>
+            <a:tailEnd/>
+          </a:ln>
+        </p:spPr>
+      </p:pic>
+      <p:pic>
+        <p:nvPicPr>
+          <p:cNvPr id="7176" name="Picture 8"/>
+          <p:cNvPicPr>
+            <a:picLocks noChangeAspect="1" noChangeArrowheads="1"/>
+          </p:cNvPicPr>
+          <p:nvPr/>
+        </p:nvPicPr>
+        <p:blipFill>
+          <a:blip r:embed="rId5" cstate="print"/>
+          <a:srcRect/>
+          <a:stretch>
+            <a:fillRect/>
+          </a:stretch>
+        </p:blipFill>
+        <p:spPr bwMode="auto">
+          <a:xfrm>
+            <a:off x="4644008" y="1556792"/>
+            <a:ext cx="2647950" cy="733425"/>
+          </a:xfrm>
+          <a:prstGeom prst="rect">
+            <a:avLst/>
+          </a:prstGeom>
+          <a:noFill/>
+          <a:ln w="9525">
+            <a:noFill/>
+            <a:miter lim="800000"/>
+            <a:headEnd/>
+            <a:tailEnd/>
+          </a:ln>
+        </p:spPr>
+      </p:pic>
+      <p:sp>
+        <p:nvSpPr>
+          <p:cNvPr id="11" name="Šrafovaná šipka doprava 10"/>
+          <p:cNvSpPr/>
+          <p:nvPr/>
+        </p:nvSpPr>
+        <p:spPr>
+          <a:xfrm>
+            <a:off x="2684909" y="1772816"/>
+            <a:ext cx="576064" cy="432048"/>
+          </a:xfrm>
+          <a:prstGeom prst="stripedRightArrow">
+            <a:avLst/>
+          </a:prstGeom>
+        </p:spPr>
+        <p:style>
+          <a:lnRef idx="2">
+            <a:schemeClr val="accent1">
+              <a:shade val="50000"/>
+            </a:schemeClr>
+          </a:lnRef>
+          <a:fillRef idx="1">
+            <a:schemeClr val="accent1"/>
+          </a:fillRef>
+          <a:effectRef idx="0">
+            <a:schemeClr val="accent1"/>
+          </a:effectRef>
+          <a:fontRef idx="minor">
+            <a:schemeClr val="lt1"/>
+          </a:fontRef>
+        </p:style>
+        <p:txBody>
+          <a:bodyPr rtlCol="0" anchor="ctr"/>
+          <a:lstStyle/>
+          <a:p>
+            <a:pPr algn="ctr"/>
+            <a:endParaRPr lang="cs-CZ"/>
+          </a:p>
+        </p:txBody>
+      </p:sp>
+      <p:pic>
+        <p:nvPicPr>
+          <p:cNvPr id="7177" name="Picture 9"/>
+          <p:cNvPicPr>
+            <a:picLocks noChangeAspect="1" noChangeArrowheads="1"/>
+          </p:cNvPicPr>
+          <p:nvPr/>
+        </p:nvPicPr>
+        <p:blipFill>
+          <a:blip r:embed="rId6" cstate="print"/>
+          <a:srcRect/>
+          <a:stretch>
+            <a:fillRect/>
+          </a:stretch>
+        </p:blipFill>
+        <p:spPr bwMode="auto">
+          <a:xfrm>
+            <a:off x="323528" y="3509392"/>
+            <a:ext cx="3705225" cy="1609725"/>
+          </a:xfrm>
+          <a:prstGeom prst="rect">
+            <a:avLst/>
+          </a:prstGeom>
+          <a:noFill/>
+          <a:ln w="9525">
+            <a:noFill/>
+            <a:miter lim="800000"/>
+            <a:headEnd/>
+            <a:tailEnd/>
+          </a:ln>
+        </p:spPr>
+      </p:pic>
+      <p:sp>
+        <p:nvSpPr>
+          <p:cNvPr id="14" name="Šrafovaná šipka doprava 13"/>
+          <p:cNvSpPr/>
+          <p:nvPr/>
+        </p:nvSpPr>
+        <p:spPr>
+          <a:xfrm>
+            <a:off x="7020272" y="1772816"/>
+            <a:ext cx="576064" cy="432048"/>
+          </a:xfrm>
+          <a:prstGeom prst="stripedRightArrow">
+            <a:avLst/>
+          </a:prstGeom>
+        </p:spPr>
+        <p:style>
+          <a:lnRef idx="2">
+            <a:schemeClr val="accent1">
+              <a:shade val="50000"/>
+            </a:schemeClr>
+          </a:lnRef>
+          <a:fillRef idx="1">
+            <a:schemeClr val="accent1"/>
+          </a:fillRef>
+          <a:effectRef idx="0">
+            <a:schemeClr val="accent1"/>
+          </a:effectRef>
+          <a:fontRef idx="minor">
+            <a:schemeClr val="lt1"/>
+          </a:fontRef>
+        </p:style>
+        <p:txBody>
+          <a:bodyPr rtlCol="0" anchor="ctr"/>
+          <a:lstStyle/>
+          <a:p>
+            <a:pPr algn="ctr"/>
+            <a:endParaRPr lang="cs-CZ"/>
+          </a:p>
+        </p:txBody>
+      </p:sp>
+      <p:pic>
+        <p:nvPicPr>
+          <p:cNvPr id="7178" name="Picture 10"/>
+          <p:cNvPicPr>
+            <a:picLocks noChangeAspect="1" noChangeArrowheads="1"/>
+          </p:cNvPicPr>
+          <p:nvPr/>
+        </p:nvPicPr>
+        <p:blipFill>
+          <a:blip r:embed="rId7" cstate="print"/>
+          <a:srcRect/>
+          <a:stretch>
+            <a:fillRect/>
+          </a:stretch>
+        </p:blipFill>
+        <p:spPr bwMode="auto">
+          <a:xfrm>
+            <a:off x="4716016" y="3501008"/>
+            <a:ext cx="3676650" cy="1762125"/>
+          </a:xfrm>
+          <a:prstGeom prst="rect">
+            <a:avLst/>
+          </a:prstGeom>
+          <a:noFill/>
+          <a:ln w="9525">
+            <a:noFill/>
+            <a:miter lim="800000"/>
+            <a:headEnd/>
+            <a:tailEnd/>
+          </a:ln>
+        </p:spPr>
+      </p:pic>
+      <p:pic>
+        <p:nvPicPr>
+          <p:cNvPr id="7179" name="Picture 11"/>
+          <p:cNvPicPr>
+            <a:picLocks noChangeAspect="1" noChangeArrowheads="1"/>
+          </p:cNvPicPr>
+          <p:nvPr/>
+        </p:nvPicPr>
+        <p:blipFill>
+          <a:blip r:embed="rId8" cstate="print"/>
+          <a:srcRect/>
+          <a:stretch>
+            <a:fillRect/>
+          </a:stretch>
+        </p:blipFill>
+        <p:spPr bwMode="auto">
+          <a:xfrm>
+            <a:off x="5076056" y="5445224"/>
+            <a:ext cx="2362200" cy="771525"/>
+          </a:xfrm>
+          <a:prstGeom prst="rect">
+            <a:avLst/>
+          </a:prstGeom>
+          <a:noFill/>
+          <a:ln w="9525">
+            <a:noFill/>
+            <a:miter lim="800000"/>
+            <a:headEnd/>
+            <a:tailEnd/>
+          </a:ln>
+        </p:spPr>
+      </p:pic>
+      <p:pic>
+        <p:nvPicPr>
+          <p:cNvPr id="7180" name="Picture 12"/>
+          <p:cNvPicPr>
+            <a:picLocks noChangeAspect="1" noChangeArrowheads="1"/>
+          </p:cNvPicPr>
+          <p:nvPr/>
+        </p:nvPicPr>
+        <p:blipFill>
+          <a:blip r:embed="rId9" cstate="print"/>
+          <a:srcRect/>
+          <a:stretch>
+            <a:fillRect/>
+          </a:stretch>
+        </p:blipFill>
+        <p:spPr bwMode="auto">
+          <a:xfrm>
+            <a:off x="1547664" y="5805264"/>
+            <a:ext cx="1943100" cy="457200"/>
+          </a:xfrm>
+          <a:prstGeom prst="rect">
+            <a:avLst/>
+          </a:prstGeom>
+          <a:noFill/>
+          <a:ln w="9525">
+            <a:noFill/>
+            <a:miter lim="800000"/>
+            <a:headEnd/>
+            <a:tailEnd/>
+          </a:ln>
+        </p:spPr>
+      </p:pic>
+      <p:sp>
+        <p:nvSpPr>
+          <p:cNvPr id="18" name="Šrafovaná šipka doprava 17"/>
+          <p:cNvSpPr/>
+          <p:nvPr/>
+        </p:nvSpPr>
+        <p:spPr>
+          <a:xfrm rot="5400000">
+            <a:off x="2195736" y="5229200"/>
+            <a:ext cx="576064" cy="432048"/>
+          </a:xfrm>
+          <a:prstGeom prst="stripedRightArrow">
+            <a:avLst/>
+          </a:prstGeom>
+        </p:spPr>
+        <p:style>
+          <a:lnRef idx="2">
+            <a:schemeClr val="accent1">
+              <a:shade val="50000"/>
+            </a:schemeClr>
+          </a:lnRef>
+          <a:fillRef idx="1">
+            <a:schemeClr val="accent1"/>
+          </a:fillRef>
+          <a:effectRef idx="0">
+            <a:schemeClr val="accent1"/>
+          </a:effectRef>
+          <a:fontRef idx="minor">
+            <a:schemeClr val="lt1"/>
+          </a:fontRef>
+        </p:style>
+        <p:txBody>
+          <a:bodyPr rtlCol="0" anchor="ctr"/>
+          <a:lstStyle/>
+          <a:p>
+            <a:pPr algn="ctr"/>
+            <a:endParaRPr lang="cs-CZ"/>
+          </a:p>
+        </p:txBody>
+      </p:sp>
+      <p:sp>
+        <p:nvSpPr>
+          <p:cNvPr id="19" name="Šrafovaná šipka doprava 18"/>
+          <p:cNvSpPr/>
+          <p:nvPr/>
+        </p:nvSpPr>
+        <p:spPr>
+          <a:xfrm rot="5400000">
+            <a:off x="6624228" y="5193196"/>
+            <a:ext cx="504056" cy="432048"/>
+          </a:xfrm>
+          <a:prstGeom prst="stripedRightArrow">
+            <a:avLst/>
+          </a:prstGeom>
+        </p:spPr>
+        <p:style>
+          <a:lnRef idx="2">
+            <a:schemeClr val="accent1">
+              <a:shade val="50000"/>
+            </a:schemeClr>
+          </a:lnRef>
+          <a:fillRef idx="1">
+            <a:schemeClr val="accent1"/>
+          </a:fillRef>
+          <a:effectRef idx="0">
+            <a:schemeClr val="accent1"/>
+          </a:effectRef>
+          <a:fontRef idx="minor">
+            <a:schemeClr val="lt1"/>
+          </a:fontRef>
+        </p:style>
+        <p:txBody>
+          <a:bodyPr rtlCol="0" anchor="ctr"/>
+          <a:lstStyle/>
+          <a:p>
+            <a:pPr algn="ctr"/>
+            <a:endParaRPr lang="cs-CZ"/>
+          </a:p>
+        </p:txBody>
+      </p:sp>
+      <p:cxnSp>
+        <p:nvCxnSpPr>
+          <p:cNvPr id="22" name="Přímá spojovací čára 21"/>
+          <p:cNvCxnSpPr/>
+          <p:nvPr/>
+        </p:nvCxnSpPr>
+        <p:spPr>
+          <a:xfrm>
+            <a:off x="251520" y="3068960"/>
+            <a:ext cx="8712968" cy="0"/>
+          </a:xfrm>
+          <a:prstGeom prst="line">
+            <a:avLst/>
+          </a:prstGeom>
+        </p:spPr>
+        <p:style>
+          <a:lnRef idx="1">
+            <a:schemeClr val="accent1"/>
+          </a:lnRef>
+          <a:fillRef idx="0">
+            <a:schemeClr val="accent1"/>
+          </a:fillRef>
+          <a:effectRef idx="0">
+            <a:schemeClr val="accent1"/>
+          </a:effectRef>
+          <a:fontRef idx="minor">
+            <a:schemeClr val="tx1"/>
+          </a:fontRef>
+        </p:style>
+      </p:cxnSp>
+      <p:sp>
+        <p:nvSpPr>
+          <p:cNvPr id="23" name="Šrafovaná šipka doprava 22"/>
+          <p:cNvSpPr/>
+          <p:nvPr/>
+        </p:nvSpPr>
+        <p:spPr>
+          <a:xfrm rot="18023328">
+            <a:off x="6835589" y="4402446"/>
+            <a:ext cx="464368" cy="285358"/>
+          </a:xfrm>
+          <a:prstGeom prst="stripedRightArrow">
+            <a:avLst/>
+          </a:prstGeom>
+        </p:spPr>
+        <p:style>
+          <a:lnRef idx="2">
+            <a:schemeClr val="accent1">
+              <a:shade val="50000"/>
+            </a:schemeClr>
+          </a:lnRef>
+          <a:fillRef idx="1">
+            <a:schemeClr val="accent1"/>
+          </a:fillRef>
+          <a:effectRef idx="0">
+            <a:schemeClr val="accent1"/>
+          </a:effectRef>
+          <a:fontRef idx="minor">
+            <a:schemeClr val="lt1"/>
+          </a:fontRef>
+        </p:style>
+        <p:txBody>
+          <a:bodyPr rtlCol="0" anchor="ctr"/>
+          <a:lstStyle/>
+          <a:p>
+            <a:pPr algn="r"/>
+            <a:endParaRPr lang="cs-CZ" dirty="0"/>
+          </a:p>
+        </p:txBody>
+      </p:sp>
+    </p:spTree>
+  </p:cSld>
+  <p:clrMapOvr>
+    <a:masterClrMapping/>
+  </p:clrMapOvr>
+  <p:timing>
+    <p:tnLst>
+      <p:par>
+        <p:cTn id="1" dur="indefinite" restart="never" nodeType="tmRoot"/>
+      </p:par>
+    </p:tnLst>
+  </p:timing>
+</p:sld>
+</file>
+
+<file path=ppt/slides/slide11.xml><?xml version="1.0" encoding="utf-8"?>
+<p:sld xmlns:a="http://schemas.openxmlformats.org/drawingml/2006/main" xmlns:r="http://schemas.openxmlformats.org/officeDocument/2006/relationships" xmlns:p="http://schemas.openxmlformats.org/presentationml/2006/main">
+  <p:cSld>
+    <p:spTree>
+      <p:nvGrpSpPr>
+        <p:cNvPr id="1" name=""/>
+        <p:cNvGrpSpPr/>
+        <p:nvPr/>
+      </p:nvGrpSpPr>
+      <p:grpSpPr>
+        <a:xfrm>
+          <a:off x="0" y="0"/>
+          <a:ext cx="0" cy="0"/>
+          <a:chOff x="0" y="0"/>
+          <a:chExt cx="0" cy="0"/>
+        </a:xfrm>
+      </p:grpSpPr>
+      <p:sp>
+        <p:nvSpPr>
+          <p:cNvPr id="2" name="Nadpis 1"/>
+          <p:cNvSpPr>
+            <a:spLocks noGrp="1"/>
+          </p:cNvSpPr>
+          <p:nvPr>
+            <p:ph type="title"/>
+          </p:nvPr>
+        </p:nvSpPr>
+        <p:spPr/>
+        <p:txBody>
+          <a:bodyPr/>
+          <a:lstStyle/>
+          <a:p>
+            <a:r>
+              <a:rPr lang="en-US" dirty="0" smtClean="0"/>
+              <a:t>Chemical Reaction</a:t>
+            </a:r>
+            <a:endParaRPr lang="cs-CZ" dirty="0"/>
+          </a:p>
+        </p:txBody>
+      </p:sp>
+      <p:pic>
+        <p:nvPicPr>
+          <p:cNvPr id="1027" name="Picture 3"/>
+          <p:cNvPicPr>
+            <a:picLocks noChangeAspect="1" noChangeArrowheads="1"/>
+          </p:cNvPicPr>
+          <p:nvPr/>
+        </p:nvPicPr>
+        <p:blipFill>
+          <a:blip r:embed="rId2" cstate="print"/>
+          <a:srcRect/>
+          <a:stretch>
+            <a:fillRect/>
+          </a:stretch>
+        </p:blipFill>
+        <p:spPr bwMode="auto">
+          <a:xfrm>
+            <a:off x="395536" y="404664"/>
+            <a:ext cx="1352550" cy="733425"/>
+          </a:xfrm>
+          <a:prstGeom prst="rect">
+            <a:avLst/>
+          </a:prstGeom>
+          <a:noFill/>
+          <a:ln w="9525">
+            <a:noFill/>
+            <a:miter lim="800000"/>
+            <a:headEnd/>
+            <a:tailEnd/>
+          </a:ln>
+        </p:spPr>
+      </p:pic>
+      <p:pic>
+        <p:nvPicPr>
+          <p:cNvPr id="1028" name="Picture 4"/>
+          <p:cNvPicPr>
+            <a:picLocks noGrp="1" noChangeAspect="1" noChangeArrowheads="1"/>
+          </p:cNvPicPr>
+          <p:nvPr>
+            <p:ph idx="1"/>
+          </p:nvPr>
+        </p:nvPicPr>
+        <p:blipFill>
+          <a:blip r:embed="rId3" cstate="print"/>
+          <a:srcRect/>
+          <a:stretch>
+            <a:fillRect/>
+          </a:stretch>
+        </p:blipFill>
+        <p:spPr bwMode="auto">
+          <a:xfrm>
+            <a:off x="1699260" y="1885791"/>
+            <a:ext cx="5745480" cy="3954780"/>
+          </a:xfrm>
+          <a:prstGeom prst="rect">
+            <a:avLst/>
+          </a:prstGeom>
+          <a:noFill/>
+          <a:ln w="9525">
+            <a:noFill/>
+            <a:miter lim="800000"/>
+            <a:headEnd/>
+            <a:tailEnd/>
+          </a:ln>
+        </p:spPr>
+      </p:pic>
+    </p:spTree>
+  </p:cSld>
+  <p:clrMapOvr>
+    <a:masterClrMapping/>
+  </p:clrMapOvr>
+  <p:timing>
+    <p:tnLst>
+      <p:par>
+        <p:cTn id="1" dur="indefinite" restart="never" nodeType="tmRoot"/>
+      </p:par>
+    </p:tnLst>
+  </p:timing>
+</p:sld>
+</file>
+
+<file path=ppt/slides/slide12.xml><?xml version="1.0" encoding="utf-8"?>
+<p:sld xmlns:a="http://schemas.openxmlformats.org/drawingml/2006/main" xmlns:r="http://schemas.openxmlformats.org/officeDocument/2006/relationships" xmlns:p="http://schemas.openxmlformats.org/presentationml/2006/main">
+  <p:cSld>
+    <p:spTree>
+      <p:nvGrpSpPr>
+        <p:cNvPr id="1" name=""/>
+        <p:cNvGrpSpPr/>
+        <p:nvPr/>
+      </p:nvGrpSpPr>
+      <p:grpSpPr>
+        <a:xfrm>
+          <a:off x="0" y="0"/>
+          <a:ext cx="0" cy="0"/>
+          <a:chOff x="0" y="0"/>
+          <a:chExt cx="0" cy="0"/>
+        </a:xfrm>
+      </p:grpSpPr>
+      <p:sp>
+        <p:nvSpPr>
+          <p:cNvPr id="2" name="Nadpis 1"/>
+          <p:cNvSpPr>
+            <a:spLocks noGrp="1"/>
+          </p:cNvSpPr>
+          <p:nvPr>
+            <p:ph type="title"/>
+          </p:nvPr>
+        </p:nvSpPr>
+        <p:spPr/>
+        <p:txBody>
+          <a:bodyPr/>
+          <a:lstStyle/>
+          <a:p>
+            <a:r>
+              <a:rPr lang="en-US" dirty="0" smtClean="0"/>
+              <a:t>Chemical Reaction</a:t>
+            </a:r>
+            <a:endParaRPr lang="cs-CZ" dirty="0"/>
+          </a:p>
+        </p:txBody>
+      </p:sp>
+      <p:pic>
+        <p:nvPicPr>
+          <p:cNvPr id="1027" name="Picture 3"/>
+          <p:cNvPicPr>
+            <a:picLocks noChangeAspect="1" noChangeArrowheads="1"/>
+          </p:cNvPicPr>
+          <p:nvPr/>
+        </p:nvPicPr>
+        <p:blipFill>
+          <a:blip r:embed="rId2" cstate="print"/>
+          <a:srcRect/>
+          <a:stretch>
+            <a:fillRect/>
+          </a:stretch>
+        </p:blipFill>
+        <p:spPr bwMode="auto">
+          <a:xfrm>
+            <a:off x="395536" y="404664"/>
+            <a:ext cx="1352550" cy="733425"/>
+          </a:xfrm>
+          <a:prstGeom prst="rect">
+            <a:avLst/>
+          </a:prstGeom>
+          <a:noFill/>
+          <a:ln w="9525">
+            <a:noFill/>
+            <a:miter lim="800000"/>
+            <a:headEnd/>
+            <a:tailEnd/>
+          </a:ln>
+        </p:spPr>
+      </p:pic>
+      <p:pic>
+        <p:nvPicPr>
+          <p:cNvPr id="2051" name="Picture 3"/>
+          <p:cNvPicPr>
+            <a:picLocks noGrp="1" noChangeAspect="1" noChangeArrowheads="1"/>
+          </p:cNvPicPr>
+          <p:nvPr>
+            <p:ph idx="1"/>
+          </p:nvPr>
+        </p:nvPicPr>
+        <p:blipFill>
+          <a:blip r:embed="rId3" cstate="print"/>
+          <a:srcRect/>
+          <a:stretch>
+            <a:fillRect/>
+          </a:stretch>
+        </p:blipFill>
+        <p:spPr bwMode="auto">
+          <a:xfrm>
+            <a:off x="1699260" y="1885791"/>
+            <a:ext cx="5745480" cy="3954780"/>
+          </a:xfrm>
+          <a:prstGeom prst="rect">
+            <a:avLst/>
+          </a:prstGeom>
+          <a:noFill/>
+          <a:ln w="9525">
+            <a:noFill/>
+            <a:miter lim="800000"/>
+            <a:headEnd/>
+            <a:tailEnd/>
+          </a:ln>
+        </p:spPr>
+      </p:pic>
+    </p:spTree>
+  </p:cSld>
+  <p:clrMapOvr>
+    <a:masterClrMapping/>
+  </p:clrMapOvr>
+  <p:timing>
+    <p:tnLst>
+      <p:par>
+        <p:cTn id="1" dur="indefinite" restart="never" nodeType="tmRoot"/>
+      </p:par>
+    </p:tnLst>
+  </p:timing>
+</p:sld>
+</file>
+
+<file path=ppt/slides/slide13.xml><?xml version="1.0" encoding="utf-8"?>
+<p:sld xmlns:a="http://schemas.openxmlformats.org/drawingml/2006/main" xmlns:r="http://schemas.openxmlformats.org/officeDocument/2006/relationships" xmlns:p="http://schemas.openxmlformats.org/presentationml/2006/main">
+  <p:cSld>
+    <p:spTree>
+      <p:nvGrpSpPr>
+        <p:cNvPr id="1" name=""/>
+        <p:cNvGrpSpPr/>
+        <p:nvPr/>
+      </p:nvGrpSpPr>
+      <p:grpSpPr>
+        <a:xfrm>
+          <a:off x="0" y="0"/>
+          <a:ext cx="0" cy="0"/>
+          <a:chOff x="0" y="0"/>
+          <a:chExt cx="0" cy="0"/>
+        </a:xfrm>
+      </p:grpSpPr>
+      <p:sp>
+        <p:nvSpPr>
+          <p:cNvPr id="2" name="Nadpis 1"/>
+          <p:cNvSpPr>
+            <a:spLocks noGrp="1"/>
+          </p:cNvSpPr>
+          <p:nvPr>
+            <p:ph type="title"/>
+          </p:nvPr>
+        </p:nvSpPr>
+        <p:spPr/>
+        <p:txBody>
+          <a:bodyPr/>
+          <a:lstStyle/>
+          <a:p>
+            <a:r>
+              <a:rPr lang="en-US" dirty="0" smtClean="0"/>
+              <a:t>Chemical Reaction</a:t>
+            </a:r>
+            <a:endParaRPr lang="cs-CZ" dirty="0"/>
+          </a:p>
+        </p:txBody>
+      </p:sp>
+      <p:pic>
+        <p:nvPicPr>
+          <p:cNvPr id="1027" name="Picture 3"/>
+          <p:cNvPicPr>
+            <a:picLocks noChangeAspect="1" noChangeArrowheads="1"/>
+          </p:cNvPicPr>
+          <p:nvPr/>
+        </p:nvPicPr>
+        <p:blipFill>
+          <a:blip r:embed="rId2" cstate="print"/>
+          <a:srcRect/>
+          <a:stretch>
+            <a:fillRect/>
+          </a:stretch>
+        </p:blipFill>
+        <p:spPr bwMode="auto">
+          <a:xfrm>
+            <a:off x="395536" y="404664"/>
+            <a:ext cx="1352550" cy="733425"/>
+          </a:xfrm>
+          <a:prstGeom prst="rect">
+            <a:avLst/>
+          </a:prstGeom>
+          <a:noFill/>
+          <a:ln w="9525">
+            <a:noFill/>
+            <a:miter lim="800000"/>
+            <a:headEnd/>
+            <a:tailEnd/>
+          </a:ln>
+        </p:spPr>
+      </p:pic>
+      <p:pic>
+        <p:nvPicPr>
+          <p:cNvPr id="3074" name="Picture 2"/>
+          <p:cNvPicPr>
+            <a:picLocks noGrp="1" noChangeAspect="1" noChangeArrowheads="1"/>
+          </p:cNvPicPr>
+          <p:nvPr>
+            <p:ph idx="1"/>
+          </p:nvPr>
+        </p:nvPicPr>
+        <p:blipFill>
+          <a:blip r:embed="rId3" cstate="print"/>
+          <a:srcRect/>
+          <a:stretch>
+            <a:fillRect/>
+          </a:stretch>
+        </p:blipFill>
+        <p:spPr bwMode="auto">
+          <a:xfrm>
+            <a:off x="1699490" y="1885950"/>
+            <a:ext cx="5745019" cy="3954463"/>
+          </a:xfrm>
+          <a:prstGeom prst="rect">
+            <a:avLst/>
+          </a:prstGeom>
+          <a:noFill/>
+          <a:ln w="9525">
+            <a:noFill/>
+            <a:miter lim="800000"/>
+            <a:headEnd/>
+            <a:tailEnd/>
+          </a:ln>
+        </p:spPr>
+      </p:pic>
+    </p:spTree>
+  </p:cSld>
+  <p:clrMapOvr>
+    <a:masterClrMapping/>
+  </p:clrMapOvr>
+  <p:timing>
+    <p:tnLst>
+      <p:par>
+        <p:cTn id="1" dur="indefinite" restart="never" nodeType="tmRoot"/>
+      </p:par>
+    </p:tnLst>
+  </p:timing>
+</p:sld>
+</file>
+
+<file path=ppt/slides/slide14.xml><?xml version="1.0" encoding="utf-8"?>
+<p:sld xmlns:a="http://schemas.openxmlformats.org/drawingml/2006/main" xmlns:r="http://schemas.openxmlformats.org/officeDocument/2006/relationships" xmlns:p="http://schemas.openxmlformats.org/presentationml/2006/main">
+  <p:cSld>
+    <p:spTree>
+      <p:nvGrpSpPr>
+        <p:cNvPr id="1" name=""/>
+        <p:cNvGrpSpPr/>
+        <p:nvPr/>
+      </p:nvGrpSpPr>
+      <p:grpSpPr>
+        <a:xfrm>
+          <a:off x="0" y="0"/>
+          <a:ext cx="0" cy="0"/>
+          <a:chOff x="0" y="0"/>
+          <a:chExt cx="0" cy="0"/>
+        </a:xfrm>
+      </p:grpSpPr>
+      <p:sp>
+        <p:nvSpPr>
+          <p:cNvPr id="2" name="Nadpis 1"/>
+          <p:cNvSpPr>
+            <a:spLocks noGrp="1"/>
+          </p:cNvSpPr>
+          <p:nvPr>
+            <p:ph type="title"/>
+          </p:nvPr>
+        </p:nvSpPr>
+        <p:spPr/>
+        <p:txBody>
+          <a:bodyPr/>
+          <a:lstStyle/>
+          <a:p>
+            <a:r>
+              <a:rPr lang="en-US" dirty="0" smtClean="0"/>
+              <a:t>STEADY STATES</a:t>
+            </a:r>
+            <a:endParaRPr lang="cs-CZ" dirty="0"/>
+          </a:p>
+        </p:txBody>
+      </p:sp>
+      <p:sp>
+        <p:nvSpPr>
+          <p:cNvPr id="3" name="Zástupný symbol pro obsah 2"/>
+          <p:cNvSpPr>
+            <a:spLocks noGrp="1"/>
+          </p:cNvSpPr>
+          <p:nvPr>
+            <p:ph idx="1"/>
+          </p:nvPr>
+        </p:nvSpPr>
+        <p:spPr>
+          <a:xfrm>
+            <a:off x="467544" y="1340768"/>
+            <a:ext cx="8229600" cy="4525963"/>
+          </a:xfrm>
+        </p:spPr>
+        <p:txBody>
+          <a:bodyPr/>
+          <a:lstStyle/>
+          <a:p>
+            <a:r>
+              <a:rPr lang="en-US" dirty="0" smtClean="0"/>
+              <a:t>Zero derivations (</a:t>
+            </a:r>
+            <a:r>
+              <a:rPr lang="en-US" i="1" dirty="0" smtClean="0"/>
+              <a:t>dependent equation set</a:t>
+            </a:r>
+            <a:r>
+              <a:rPr lang="en-US" dirty="0" smtClean="0"/>
+              <a:t>)</a:t>
+            </a:r>
+          </a:p>
+        </p:txBody>
+      </p:sp>
+      <p:pic>
+        <p:nvPicPr>
+          <p:cNvPr id="11266" name="Picture 2"/>
+          <p:cNvPicPr>
+            <a:picLocks noChangeAspect="1" noChangeArrowheads="1"/>
+          </p:cNvPicPr>
+          <p:nvPr/>
+        </p:nvPicPr>
+        <p:blipFill>
+          <a:blip r:embed="rId2" cstate="print"/>
+          <a:srcRect/>
+          <a:stretch>
+            <a:fillRect/>
+          </a:stretch>
+        </p:blipFill>
+        <p:spPr bwMode="auto">
+          <a:xfrm>
+            <a:off x="251520" y="3645371"/>
+            <a:ext cx="5476875" cy="2447925"/>
+          </a:xfrm>
+          <a:prstGeom prst="rect">
+            <a:avLst/>
+          </a:prstGeom>
+          <a:noFill/>
+          <a:ln w="9525">
+            <a:noFill/>
+            <a:miter lim="800000"/>
+            <a:headEnd/>
+            <a:tailEnd/>
+          </a:ln>
+        </p:spPr>
+      </p:pic>
+      <p:pic>
+        <p:nvPicPr>
+          <p:cNvPr id="11268" name="Picture 4"/>
+          <p:cNvPicPr>
+            <a:picLocks noChangeAspect="1" noChangeArrowheads="1"/>
+          </p:cNvPicPr>
+          <p:nvPr/>
+        </p:nvPicPr>
+        <p:blipFill>
+          <a:blip r:embed="rId3" cstate="print"/>
+          <a:srcRect/>
+          <a:stretch>
+            <a:fillRect/>
+          </a:stretch>
+        </p:blipFill>
+        <p:spPr bwMode="auto">
+          <a:xfrm>
+            <a:off x="395536" y="2277219"/>
+            <a:ext cx="3067050" cy="1133475"/>
+          </a:xfrm>
+          <a:prstGeom prst="rect">
+            <a:avLst/>
+          </a:prstGeom>
+          <a:noFill/>
+          <a:ln w="9525">
+            <a:noFill/>
+            <a:miter lim="800000"/>
+            <a:headEnd/>
+            <a:tailEnd/>
+          </a:ln>
+        </p:spPr>
+      </p:pic>
+      <p:pic>
+        <p:nvPicPr>
+          <p:cNvPr id="11269" name="Picture 5"/>
+          <p:cNvPicPr>
+            <a:picLocks noChangeAspect="1" noChangeArrowheads="1"/>
+          </p:cNvPicPr>
+          <p:nvPr/>
+        </p:nvPicPr>
+        <p:blipFill>
+          <a:blip r:embed="rId4" cstate="print"/>
+          <a:srcRect/>
+          <a:stretch>
+            <a:fillRect/>
+          </a:stretch>
+        </p:blipFill>
+        <p:spPr bwMode="auto">
+          <a:xfrm>
+            <a:off x="4283968" y="2133203"/>
+            <a:ext cx="3086100" cy="1114425"/>
+          </a:xfrm>
+          <a:prstGeom prst="rect">
+            <a:avLst/>
+          </a:prstGeom>
+          <a:noFill/>
+          <a:ln w="9525">
+            <a:noFill/>
+            <a:miter lim="800000"/>
+            <a:headEnd/>
+            <a:tailEnd/>
+          </a:ln>
+        </p:spPr>
+      </p:pic>
+      <p:sp>
+        <p:nvSpPr>
+          <p:cNvPr id="8" name="Šrafovaná šipka doprava 7"/>
+          <p:cNvSpPr/>
+          <p:nvPr/>
+        </p:nvSpPr>
+        <p:spPr>
+          <a:xfrm rot="6360321">
+            <a:off x="320942" y="4005626"/>
+            <a:ext cx="1483273" cy="236173"/>
+          </a:xfrm>
+          <a:prstGeom prst="stripedRightArrow">
+            <a:avLst/>
+          </a:prstGeom>
+        </p:spPr>
+        <p:style>
+          <a:lnRef idx="2">
+            <a:schemeClr val="accent1">
+              <a:shade val="50000"/>
+            </a:schemeClr>
+          </a:lnRef>
+          <a:fillRef idx="1">
+            <a:schemeClr val="accent1"/>
+          </a:fillRef>
+          <a:effectRef idx="0">
+            <a:schemeClr val="accent1"/>
+          </a:effectRef>
+          <a:fontRef idx="minor">
+            <a:schemeClr val="lt1"/>
+          </a:fontRef>
+        </p:style>
+        <p:txBody>
+          <a:bodyPr rtlCol="0" anchor="ctr"/>
+          <a:lstStyle/>
+          <a:p>
+            <a:pPr algn="ctr"/>
+            <a:endParaRPr lang="cs-CZ"/>
+          </a:p>
+        </p:txBody>
+      </p:sp>
+      <p:sp>
+        <p:nvSpPr>
+          <p:cNvPr id="9" name="Šrafovaná šipka doprava 8"/>
+          <p:cNvSpPr/>
+          <p:nvPr/>
+        </p:nvSpPr>
+        <p:spPr>
+          <a:xfrm rot="6854150">
+            <a:off x="3313247" y="4116860"/>
+            <a:ext cx="1669717" cy="213844"/>
+          </a:xfrm>
+          <a:prstGeom prst="stripedRightArrow">
+            <a:avLst/>
+          </a:prstGeom>
+        </p:spPr>
+        <p:style>
+          <a:lnRef idx="2">
+            <a:schemeClr val="accent1">
+              <a:shade val="50000"/>
+            </a:schemeClr>
+          </a:lnRef>
+          <a:fillRef idx="1">
+            <a:schemeClr val="accent1"/>
+          </a:fillRef>
+          <a:effectRef idx="0">
+            <a:schemeClr val="accent1"/>
+          </a:effectRef>
+          <a:fontRef idx="minor">
+            <a:schemeClr val="lt1"/>
+          </a:fontRef>
+        </p:style>
+        <p:txBody>
+          <a:bodyPr rtlCol="0" anchor="ctr"/>
+          <a:lstStyle/>
+          <a:p>
+            <a:pPr algn="ctr"/>
+            <a:endParaRPr lang="cs-CZ"/>
+          </a:p>
+        </p:txBody>
+      </p:sp>
+      <p:sp>
+        <p:nvSpPr>
+          <p:cNvPr id="10" name="Šrafovaná šipka doprava 9"/>
+          <p:cNvSpPr/>
+          <p:nvPr/>
+        </p:nvSpPr>
+        <p:spPr>
+          <a:xfrm rot="7896606">
+            <a:off x="3916448" y="3475943"/>
+            <a:ext cx="544053" cy="224442"/>
+          </a:xfrm>
+          <a:prstGeom prst="stripedRightArrow">
+            <a:avLst/>
+          </a:prstGeom>
+        </p:spPr>
+        <p:style>
+          <a:lnRef idx="2">
+            <a:schemeClr val="accent1">
+              <a:shade val="50000"/>
+            </a:schemeClr>
+          </a:lnRef>
+          <a:fillRef idx="1">
+            <a:schemeClr val="accent1"/>
+          </a:fillRef>
+          <a:effectRef idx="0">
+            <a:schemeClr val="accent1"/>
+          </a:effectRef>
+          <a:fontRef idx="minor">
+            <a:schemeClr val="lt1"/>
+          </a:fontRef>
+        </p:style>
+        <p:txBody>
+          <a:bodyPr rtlCol="0" anchor="ctr"/>
+          <a:lstStyle/>
+          <a:p>
+            <a:pPr algn="ctr"/>
+            <a:endParaRPr lang="cs-CZ"/>
+          </a:p>
+        </p:txBody>
+      </p:sp>
+      <p:pic>
+        <p:nvPicPr>
+          <p:cNvPr id="11271" name="Picture 7"/>
+          <p:cNvPicPr>
+            <a:picLocks noChangeAspect="1" noChangeArrowheads="1"/>
+          </p:cNvPicPr>
+          <p:nvPr/>
+        </p:nvPicPr>
+        <p:blipFill>
+          <a:blip r:embed="rId5" cstate="print"/>
+          <a:srcRect/>
+          <a:stretch>
+            <a:fillRect/>
+          </a:stretch>
+        </p:blipFill>
+        <p:spPr bwMode="auto">
+          <a:xfrm>
+            <a:off x="6156176" y="4221088"/>
+            <a:ext cx="2724150" cy="847725"/>
+          </a:xfrm>
+          <a:prstGeom prst="rect">
+            <a:avLst/>
+          </a:prstGeom>
+          <a:noFill/>
+          <a:ln w="9525">
+            <a:noFill/>
+            <a:miter lim="800000"/>
+            <a:headEnd/>
+            <a:tailEnd/>
+          </a:ln>
+        </p:spPr>
+      </p:pic>
+      <p:sp>
+        <p:nvSpPr>
+          <p:cNvPr id="13" name="Šrafovaná šipka doprava 12"/>
+          <p:cNvSpPr/>
+          <p:nvPr/>
+        </p:nvSpPr>
+        <p:spPr>
+          <a:xfrm rot="12798529">
+            <a:off x="5514223" y="4154020"/>
+            <a:ext cx="604164" cy="206143"/>
+          </a:xfrm>
+          <a:prstGeom prst="stripedRightArrow">
+            <a:avLst/>
+          </a:prstGeom>
+        </p:spPr>
+        <p:style>
+          <a:lnRef idx="2">
+            <a:schemeClr val="accent1">
+              <a:shade val="50000"/>
+            </a:schemeClr>
+          </a:lnRef>
+          <a:fillRef idx="1">
+            <a:schemeClr val="accent1"/>
+          </a:fillRef>
+          <a:effectRef idx="0">
+            <a:schemeClr val="accent1"/>
+          </a:effectRef>
+          <a:fontRef idx="minor">
+            <a:schemeClr val="lt1"/>
+          </a:fontRef>
+        </p:style>
+        <p:txBody>
+          <a:bodyPr rtlCol="0" anchor="ctr"/>
+          <a:lstStyle/>
+          <a:p>
+            <a:pPr algn="ctr"/>
+            <a:endParaRPr lang="cs-CZ"/>
+          </a:p>
+        </p:txBody>
+      </p:sp>
+      <p:sp>
+        <p:nvSpPr>
+          <p:cNvPr id="14" name="Šrafovaná šipka doprava 13"/>
+          <p:cNvSpPr/>
+          <p:nvPr/>
+        </p:nvSpPr>
+        <p:spPr>
+          <a:xfrm rot="8287270">
+            <a:off x="5499746" y="5044488"/>
+            <a:ext cx="604164" cy="206143"/>
+          </a:xfrm>
+          <a:prstGeom prst="stripedRightArrow">
+            <a:avLst/>
+          </a:prstGeom>
+        </p:spPr>
+        <p:style>
+          <a:lnRef idx="2">
+            <a:schemeClr val="accent1">
+              <a:shade val="50000"/>
+            </a:schemeClr>
+          </a:lnRef>
+          <a:fillRef idx="1">
+            <a:schemeClr val="accent1"/>
+          </a:fillRef>
+          <a:effectRef idx="0">
+            <a:schemeClr val="accent1"/>
+          </a:effectRef>
+          <a:fontRef idx="minor">
+            <a:schemeClr val="lt1"/>
+          </a:fontRef>
+        </p:style>
+        <p:txBody>
+          <a:bodyPr rtlCol="0" anchor="ctr"/>
+          <a:lstStyle/>
+          <a:p>
+            <a:pPr algn="ctr"/>
+            <a:endParaRPr lang="cs-CZ"/>
+          </a:p>
+        </p:txBody>
+      </p:sp>
+    </p:spTree>
+  </p:cSld>
+  <p:clrMapOvr>
+    <a:masterClrMapping/>
+  </p:clrMapOvr>
+  <p:transition/>
+  <p:timing>
+    <p:tnLst>
+      <p:par>
+        <p:cTn id="1" dur="indefinite" restart="never" nodeType="tmRoot"/>
+      </p:par>
+    </p:tnLst>
+  </p:timing>
+</p:sld>
+</file>
+
+<file path=ppt/slides/slide15.xml><?xml version="1.0" encoding="utf-8"?>
 <p:sld xmlns:a="http://schemas.openxmlformats.org/drawingml/2006/main" xmlns:r="http://schemas.openxmlformats.org/officeDocument/2006/relationships" xmlns:p="http://schemas.openxmlformats.org/presentationml/2006/main">
   <p:cSld>
     <p:spTree>
@@ -3162,8 +4496,8 @@
         </p:blipFill>
         <p:spPr bwMode="auto">
           <a:xfrm>
-            <a:off x="3275856" y="404664"/>
-            <a:ext cx="5591175" cy="6286500"/>
+            <a:off x="3635896" y="1628800"/>
+            <a:ext cx="4486834" cy="5044822"/>
           </a:xfrm>
           <a:prstGeom prst="rect">
             <a:avLst/>
@@ -3209,427 +4543,51 @@
           </a:ln>
         </p:spPr>
       </p:pic>
+      <p:sp>
+        <p:nvSpPr>
+          <p:cNvPr id="4" name="Nadpis 1"/>
+          <p:cNvSpPr>
+            <a:spLocks noGrp="1"/>
+          </p:cNvSpPr>
+          <p:nvPr>
+            <p:ph type="title"/>
+          </p:nvPr>
+        </p:nvSpPr>
+        <p:spPr>
+          <a:xfrm>
+            <a:off x="2339752" y="274638"/>
+            <a:ext cx="6347048" cy="1143000"/>
+          </a:xfrm>
+        </p:spPr>
+        <p:txBody>
+          <a:bodyPr/>
+          <a:lstStyle/>
+          <a:p>
+            <a:r>
+              <a:rPr lang="en-US" dirty="0" smtClean="0"/>
+              <a:t>Hydraulic</a:t>
+            </a:r>
+            <a:endParaRPr lang="cs-CZ" dirty="0"/>
+          </a:p>
+        </p:txBody>
+      </p:sp>
     </p:spTree>
   </p:cSld>
   <p:clrMapOvr>
     <a:masterClrMapping/>
   </p:clrMapOvr>
+  <p:timing>
+    <p:tnLst>
+      <p:par>
+        <p:cTn id="1" dur="indefinite" restart="never" nodeType="tmRoot"/>
+      </p:par>
+    </p:tnLst>
+  </p:timing>
 </p:sld>
 </file>
 
-<file path=ppt/slides/slide11.xml><?xml version="1.0" encoding="utf-8"?>
-<p:sld xmlns:a="http://schemas.openxmlformats.org/drawingml/2006/main" xmlns:r="http://schemas.openxmlformats.org/officeDocument/2006/relationships" xmlns:p="http://schemas.openxmlformats.org/presentationml/2006/main">
-  <p:cSld>
-    <p:spTree>
-      <p:nvGrpSpPr>
-        <p:cNvPr id="1" name=""/>
-        <p:cNvGrpSpPr/>
-        <p:nvPr/>
-      </p:nvGrpSpPr>
-      <p:grpSpPr>
-        <a:xfrm>
-          <a:off x="0" y="0"/>
-          <a:ext cx="0" cy="0"/>
-          <a:chOff x="0" y="0"/>
-          <a:chExt cx="0" cy="0"/>
-        </a:xfrm>
-      </p:grpSpPr>
-      <p:sp>
-        <p:nvSpPr>
-          <p:cNvPr id="2" name="Nadpis 1"/>
-          <p:cNvSpPr>
-            <a:spLocks noGrp="1"/>
-          </p:cNvSpPr>
-          <p:nvPr>
-            <p:ph type="title"/>
-          </p:nvPr>
-        </p:nvSpPr>
-        <p:spPr/>
-        <p:txBody>
-          <a:bodyPr/>
-          <a:lstStyle/>
-          <a:p>
-            <a:r>
-              <a:rPr lang="en-US" dirty="0" smtClean="0"/>
-              <a:t>STEADY STATES</a:t>
-            </a:r>
-            <a:endParaRPr lang="cs-CZ" dirty="0"/>
-          </a:p>
-        </p:txBody>
-      </p:sp>
-      <p:sp>
-        <p:nvSpPr>
-          <p:cNvPr id="3" name="Zástupný symbol pro obsah 2"/>
-          <p:cNvSpPr>
-            <a:spLocks noGrp="1"/>
-          </p:cNvSpPr>
-          <p:nvPr>
-            <p:ph idx="1"/>
-          </p:nvPr>
-        </p:nvSpPr>
-        <p:spPr>
-          <a:xfrm>
-            <a:off x="467544" y="1340768"/>
-            <a:ext cx="8229600" cy="4525963"/>
-          </a:xfrm>
-        </p:spPr>
-        <p:txBody>
-          <a:bodyPr/>
-          <a:lstStyle/>
-          <a:p>
-            <a:r>
-              <a:rPr lang="en-US" dirty="0" smtClean="0"/>
-              <a:t>Zero derivations (</a:t>
-            </a:r>
-            <a:r>
-              <a:rPr lang="en-US" i="1" dirty="0" smtClean="0"/>
-              <a:t>dependent equation set</a:t>
-            </a:r>
-            <a:r>
-              <a:rPr lang="en-US" dirty="0" smtClean="0"/>
-              <a:t>)</a:t>
-            </a:r>
-          </a:p>
-        </p:txBody>
-      </p:sp>
-      <p:pic>
-        <p:nvPicPr>
-          <p:cNvPr id="11266" name="Picture 2"/>
-          <p:cNvPicPr>
-            <a:picLocks noChangeAspect="1" noChangeArrowheads="1"/>
-          </p:cNvPicPr>
-          <p:nvPr/>
-        </p:nvPicPr>
-        <p:blipFill>
-          <a:blip r:embed="rId2" cstate="print"/>
-          <a:srcRect/>
-          <a:stretch>
-            <a:fillRect/>
-          </a:stretch>
-        </p:blipFill>
-        <p:spPr bwMode="auto">
-          <a:xfrm>
-            <a:off x="251520" y="3645371"/>
-            <a:ext cx="5476875" cy="2447925"/>
-          </a:xfrm>
-          <a:prstGeom prst="rect">
-            <a:avLst/>
-          </a:prstGeom>
-          <a:noFill/>
-          <a:ln w="9525">
-            <a:noFill/>
-            <a:miter lim="800000"/>
-            <a:headEnd/>
-            <a:tailEnd/>
-          </a:ln>
-        </p:spPr>
-      </p:pic>
-      <p:pic>
-        <p:nvPicPr>
-          <p:cNvPr id="11268" name="Picture 4"/>
-          <p:cNvPicPr>
-            <a:picLocks noChangeAspect="1" noChangeArrowheads="1"/>
-          </p:cNvPicPr>
-          <p:nvPr/>
-        </p:nvPicPr>
-        <p:blipFill>
-          <a:blip r:embed="rId3" cstate="print"/>
-          <a:srcRect/>
-          <a:stretch>
-            <a:fillRect/>
-          </a:stretch>
-        </p:blipFill>
-        <p:spPr bwMode="auto">
-          <a:xfrm>
-            <a:off x="395536" y="2277219"/>
-            <a:ext cx="3067050" cy="1133475"/>
-          </a:xfrm>
-          <a:prstGeom prst="rect">
-            <a:avLst/>
-          </a:prstGeom>
-          <a:noFill/>
-          <a:ln w="9525">
-            <a:noFill/>
-            <a:miter lim="800000"/>
-            <a:headEnd/>
-            <a:tailEnd/>
-          </a:ln>
-        </p:spPr>
-      </p:pic>
-      <p:pic>
-        <p:nvPicPr>
-          <p:cNvPr id="11269" name="Picture 5"/>
-          <p:cNvPicPr>
-            <a:picLocks noChangeAspect="1" noChangeArrowheads="1"/>
-          </p:cNvPicPr>
-          <p:nvPr/>
-        </p:nvPicPr>
-        <p:blipFill>
-          <a:blip r:embed="rId4" cstate="print"/>
-          <a:srcRect/>
-          <a:stretch>
-            <a:fillRect/>
-          </a:stretch>
-        </p:blipFill>
-        <p:spPr bwMode="auto">
-          <a:xfrm>
-            <a:off x="4283968" y="2133203"/>
-            <a:ext cx="3086100" cy="1114425"/>
-          </a:xfrm>
-          <a:prstGeom prst="rect">
-            <a:avLst/>
-          </a:prstGeom>
-          <a:noFill/>
-          <a:ln w="9525">
-            <a:noFill/>
-            <a:miter lim="800000"/>
-            <a:headEnd/>
-            <a:tailEnd/>
-          </a:ln>
-        </p:spPr>
-      </p:pic>
-      <p:sp>
-        <p:nvSpPr>
-          <p:cNvPr id="8" name="Šrafovaná šipka doprava 7"/>
-          <p:cNvSpPr/>
-          <p:nvPr/>
-        </p:nvSpPr>
-        <p:spPr>
-          <a:xfrm rot="6360321">
-            <a:off x="320942" y="4005626"/>
-            <a:ext cx="1483273" cy="236173"/>
-          </a:xfrm>
-          <a:prstGeom prst="stripedRightArrow">
-            <a:avLst/>
-          </a:prstGeom>
-        </p:spPr>
-        <p:style>
-          <a:lnRef idx="2">
-            <a:schemeClr val="accent1">
-              <a:shade val="50000"/>
-            </a:schemeClr>
-          </a:lnRef>
-          <a:fillRef idx="1">
-            <a:schemeClr val="accent1"/>
-          </a:fillRef>
-          <a:effectRef idx="0">
-            <a:schemeClr val="accent1"/>
-          </a:effectRef>
-          <a:fontRef idx="minor">
-            <a:schemeClr val="lt1"/>
-          </a:fontRef>
-        </p:style>
-        <p:txBody>
-          <a:bodyPr rtlCol="0" anchor="ctr"/>
-          <a:lstStyle/>
-          <a:p>
-            <a:pPr algn="ctr"/>
-            <a:endParaRPr lang="cs-CZ"/>
-          </a:p>
-        </p:txBody>
-      </p:sp>
-      <p:sp>
-        <p:nvSpPr>
-          <p:cNvPr id="9" name="Šrafovaná šipka doprava 8"/>
-          <p:cNvSpPr/>
-          <p:nvPr/>
-        </p:nvSpPr>
-        <p:spPr>
-          <a:xfrm rot="6854150">
-            <a:off x="3313247" y="4116860"/>
-            <a:ext cx="1669717" cy="213844"/>
-          </a:xfrm>
-          <a:prstGeom prst="stripedRightArrow">
-            <a:avLst/>
-          </a:prstGeom>
-        </p:spPr>
-        <p:style>
-          <a:lnRef idx="2">
-            <a:schemeClr val="accent1">
-              <a:shade val="50000"/>
-            </a:schemeClr>
-          </a:lnRef>
-          <a:fillRef idx="1">
-            <a:schemeClr val="accent1"/>
-          </a:fillRef>
-          <a:effectRef idx="0">
-            <a:schemeClr val="accent1"/>
-          </a:effectRef>
-          <a:fontRef idx="minor">
-            <a:schemeClr val="lt1"/>
-          </a:fontRef>
-        </p:style>
-        <p:txBody>
-          <a:bodyPr rtlCol="0" anchor="ctr"/>
-          <a:lstStyle/>
-          <a:p>
-            <a:pPr algn="ctr"/>
-            <a:endParaRPr lang="cs-CZ"/>
-          </a:p>
-        </p:txBody>
-      </p:sp>
-      <p:sp>
-        <p:nvSpPr>
-          <p:cNvPr id="10" name="Šrafovaná šipka doprava 9"/>
-          <p:cNvSpPr/>
-          <p:nvPr/>
-        </p:nvSpPr>
-        <p:spPr>
-          <a:xfrm rot="7896606">
-            <a:off x="3916448" y="3475943"/>
-            <a:ext cx="544053" cy="224442"/>
-          </a:xfrm>
-          <a:prstGeom prst="stripedRightArrow">
-            <a:avLst/>
-          </a:prstGeom>
-        </p:spPr>
-        <p:style>
-          <a:lnRef idx="2">
-            <a:schemeClr val="accent1">
-              <a:shade val="50000"/>
-            </a:schemeClr>
-          </a:lnRef>
-          <a:fillRef idx="1">
-            <a:schemeClr val="accent1"/>
-          </a:fillRef>
-          <a:effectRef idx="0">
-            <a:schemeClr val="accent1"/>
-          </a:effectRef>
-          <a:fontRef idx="minor">
-            <a:schemeClr val="lt1"/>
-          </a:fontRef>
-        </p:style>
-        <p:txBody>
-          <a:bodyPr rtlCol="0" anchor="ctr"/>
-          <a:lstStyle/>
-          <a:p>
-            <a:pPr algn="ctr"/>
-            <a:endParaRPr lang="cs-CZ"/>
-          </a:p>
-        </p:txBody>
-      </p:sp>
-      <p:pic>
-        <p:nvPicPr>
-          <p:cNvPr id="11271" name="Picture 7"/>
-          <p:cNvPicPr>
-            <a:picLocks noChangeAspect="1" noChangeArrowheads="1"/>
-          </p:cNvPicPr>
-          <p:nvPr/>
-        </p:nvPicPr>
-        <p:blipFill>
-          <a:blip r:embed="rId5" cstate="print"/>
-          <a:srcRect/>
-          <a:stretch>
-            <a:fillRect/>
-          </a:stretch>
-        </p:blipFill>
-        <p:spPr bwMode="auto">
-          <a:xfrm>
-            <a:off x="6156176" y="4221088"/>
-            <a:ext cx="2724150" cy="847725"/>
-          </a:xfrm>
-          <a:prstGeom prst="rect">
-            <a:avLst/>
-          </a:prstGeom>
-          <a:noFill/>
-          <a:ln w="9525">
-            <a:noFill/>
-            <a:miter lim="800000"/>
-            <a:headEnd/>
-            <a:tailEnd/>
-          </a:ln>
-        </p:spPr>
-      </p:pic>
-      <p:sp>
-        <p:nvSpPr>
-          <p:cNvPr id="13" name="Šrafovaná šipka doprava 12"/>
-          <p:cNvSpPr/>
-          <p:nvPr/>
-        </p:nvSpPr>
-        <p:spPr>
-          <a:xfrm rot="12798529">
-            <a:off x="5514223" y="4154020"/>
-            <a:ext cx="604164" cy="206143"/>
-          </a:xfrm>
-          <a:prstGeom prst="stripedRightArrow">
-            <a:avLst/>
-          </a:prstGeom>
-        </p:spPr>
-        <p:style>
-          <a:lnRef idx="2">
-            <a:schemeClr val="accent1">
-              <a:shade val="50000"/>
-            </a:schemeClr>
-          </a:lnRef>
-          <a:fillRef idx="1">
-            <a:schemeClr val="accent1"/>
-          </a:fillRef>
-          <a:effectRef idx="0">
-            <a:schemeClr val="accent1"/>
-          </a:effectRef>
-          <a:fontRef idx="minor">
-            <a:schemeClr val="lt1"/>
-          </a:fontRef>
-        </p:style>
-        <p:txBody>
-          <a:bodyPr rtlCol="0" anchor="ctr"/>
-          <a:lstStyle/>
-          <a:p>
-            <a:pPr algn="ctr"/>
-            <a:endParaRPr lang="cs-CZ"/>
-          </a:p>
-        </p:txBody>
-      </p:sp>
-      <p:sp>
-        <p:nvSpPr>
-          <p:cNvPr id="14" name="Šrafovaná šipka doprava 13"/>
-          <p:cNvSpPr/>
-          <p:nvPr/>
-        </p:nvSpPr>
-        <p:spPr>
-          <a:xfrm rot="8287270">
-            <a:off x="5499746" y="5044488"/>
-            <a:ext cx="604164" cy="206143"/>
-          </a:xfrm>
-          <a:prstGeom prst="stripedRightArrow">
-            <a:avLst/>
-          </a:prstGeom>
-        </p:spPr>
-        <p:style>
-          <a:lnRef idx="2">
-            <a:schemeClr val="accent1">
-              <a:shade val="50000"/>
-            </a:schemeClr>
-          </a:lnRef>
-          <a:fillRef idx="1">
-            <a:schemeClr val="accent1"/>
-          </a:fillRef>
-          <a:effectRef idx="0">
-            <a:schemeClr val="accent1"/>
-          </a:effectRef>
-          <a:fontRef idx="minor">
-            <a:schemeClr val="lt1"/>
-          </a:fontRef>
-        </p:style>
-        <p:txBody>
-          <a:bodyPr rtlCol="0" anchor="ctr"/>
-          <a:lstStyle/>
-          <a:p>
-            <a:pPr algn="ctr"/>
-            <a:endParaRPr lang="cs-CZ"/>
-          </a:p>
-        </p:txBody>
-      </p:sp>
-    </p:spTree>
-  </p:cSld>
-  <p:clrMapOvr>
-    <a:masterClrMapping/>
-  </p:clrMapOvr>
-</p:sld>
-</file>
-
-<file path=ppt/slides/slide12.xml><?xml version="1.0" encoding="utf-8"?>
-<p:sld xmlns:a="http://schemas.openxmlformats.org/drawingml/2006/main" xmlns:r="http://schemas.openxmlformats.org/officeDocument/2006/relationships" xmlns:p="http://schemas.openxmlformats.org/presentationml/2006/main">
+<file path=ppt/slides/slide16.xml><?xml version="1.0" encoding="utf-8"?>
+<p:sld xmlns:a="http://schemas.openxmlformats.org/drawingml/2006/main" xmlns:r="http://schemas.openxmlformats.org/officeDocument/2006/relationships" xmlns:p="http://schemas.openxmlformats.org/presentationml/2006/main" show="0">
   <p:cSld>
     <p:spTree>
       <p:nvGrpSpPr>
@@ -3714,10 +4672,294 @@
   <p:clrMapOvr>
     <a:masterClrMapping/>
   </p:clrMapOvr>
+  <p:transition/>
+  <p:timing>
+    <p:tnLst>
+      <p:par>
+        <p:cTn id="1" dur="indefinite" restart="never" nodeType="tmRoot"/>
+      </p:par>
+    </p:tnLst>
+  </p:timing>
 </p:sld>
 </file>
 
-<file path=ppt/slides/slide13.xml><?xml version="1.0" encoding="utf-8"?>
+<file path=ppt/slides/slide17.xml><?xml version="1.0" encoding="utf-8"?>
+<p:sld xmlns:a="http://schemas.openxmlformats.org/drawingml/2006/main" xmlns:r="http://schemas.openxmlformats.org/officeDocument/2006/relationships" xmlns:p="http://schemas.openxmlformats.org/presentationml/2006/main">
+  <p:cSld>
+    <p:spTree>
+      <p:nvGrpSpPr>
+        <p:cNvPr id="1" name=""/>
+        <p:cNvGrpSpPr/>
+        <p:nvPr/>
+      </p:nvGrpSpPr>
+      <p:grpSpPr>
+        <a:xfrm>
+          <a:off x="0" y="0"/>
+          <a:ext cx="0" cy="0"/>
+          <a:chOff x="0" y="0"/>
+          <a:chExt cx="0" cy="0"/>
+        </a:xfrm>
+      </p:grpSpPr>
+      <p:sp>
+        <p:nvSpPr>
+          <p:cNvPr id="2" name="Nadpis 1"/>
+          <p:cNvSpPr>
+            <a:spLocks noGrp="1"/>
+          </p:cNvSpPr>
+          <p:nvPr>
+            <p:ph type="title"/>
+          </p:nvPr>
+        </p:nvSpPr>
+        <p:spPr>
+          <a:xfrm>
+            <a:off x="2267744" y="274638"/>
+            <a:ext cx="6419056" cy="1143000"/>
+          </a:xfrm>
+        </p:spPr>
+        <p:txBody>
+          <a:bodyPr/>
+          <a:lstStyle/>
+          <a:p>
+            <a:r>
+              <a:rPr lang="en-US" dirty="0" smtClean="0"/>
+              <a:t>Osmotic</a:t>
+            </a:r>
+            <a:endParaRPr lang="cs-CZ" dirty="0"/>
+          </a:p>
+        </p:txBody>
+      </p:sp>
+      <p:pic>
+        <p:nvPicPr>
+          <p:cNvPr id="10242" name="Picture 2"/>
+          <p:cNvPicPr>
+            <a:picLocks noChangeAspect="1" noChangeArrowheads="1"/>
+          </p:cNvPicPr>
+          <p:nvPr/>
+        </p:nvPicPr>
+        <p:blipFill>
+          <a:blip r:embed="rId2" cstate="print"/>
+          <a:srcRect/>
+          <a:stretch>
+            <a:fillRect/>
+          </a:stretch>
+        </p:blipFill>
+        <p:spPr bwMode="auto">
+          <a:xfrm>
+            <a:off x="172616" y="848444"/>
+            <a:ext cx="2743200" cy="5676900"/>
+          </a:xfrm>
+          <a:prstGeom prst="rect">
+            <a:avLst/>
+          </a:prstGeom>
+          <a:noFill/>
+          <a:ln w="9525">
+            <a:noFill/>
+            <a:miter lim="800000"/>
+            <a:headEnd/>
+            <a:tailEnd/>
+          </a:ln>
+        </p:spPr>
+      </p:pic>
+      <p:pic>
+        <p:nvPicPr>
+          <p:cNvPr id="10244" name="Picture 4"/>
+          <p:cNvPicPr>
+            <a:picLocks noChangeAspect="1" noChangeArrowheads="1"/>
+          </p:cNvPicPr>
+          <p:nvPr/>
+        </p:nvPicPr>
+        <p:blipFill>
+          <a:blip r:embed="rId3" cstate="print"/>
+          <a:srcRect/>
+          <a:stretch>
+            <a:fillRect/>
+          </a:stretch>
+        </p:blipFill>
+        <p:spPr bwMode="auto">
+          <a:xfrm>
+            <a:off x="3491880" y="1268760"/>
+            <a:ext cx="4629150" cy="1571625"/>
+          </a:xfrm>
+          <a:prstGeom prst="rect">
+            <a:avLst/>
+          </a:prstGeom>
+          <a:noFill/>
+          <a:ln w="9525">
+            <a:noFill/>
+            <a:miter lim="800000"/>
+            <a:headEnd/>
+            <a:tailEnd/>
+          </a:ln>
+        </p:spPr>
+      </p:pic>
+      <p:sp>
+        <p:nvSpPr>
+          <p:cNvPr id="7" name="Šrafovaná šipka doprava 6"/>
+          <p:cNvSpPr/>
+          <p:nvPr/>
+        </p:nvSpPr>
+        <p:spPr>
+          <a:xfrm rot="20274668">
+            <a:off x="1960994" y="2482401"/>
+            <a:ext cx="1605656" cy="213843"/>
+          </a:xfrm>
+          <a:prstGeom prst="stripedRightArrow">
+            <a:avLst/>
+          </a:prstGeom>
+        </p:spPr>
+        <p:style>
+          <a:lnRef idx="2">
+            <a:schemeClr val="accent1">
+              <a:shade val="50000"/>
+            </a:schemeClr>
+          </a:lnRef>
+          <a:fillRef idx="1">
+            <a:schemeClr val="accent1"/>
+          </a:fillRef>
+          <a:effectRef idx="0">
+            <a:schemeClr val="accent1"/>
+          </a:effectRef>
+          <a:fontRef idx="minor">
+            <a:schemeClr val="lt1"/>
+          </a:fontRef>
+        </p:style>
+        <p:txBody>
+          <a:bodyPr rtlCol="0" anchor="ctr"/>
+          <a:lstStyle/>
+          <a:p>
+            <a:pPr algn="ctr"/>
+            <a:endParaRPr lang="cs-CZ"/>
+          </a:p>
+        </p:txBody>
+      </p:sp>
+      <p:sp>
+        <p:nvSpPr>
+          <p:cNvPr id="8" name="Šrafovaná šipka doprava 7"/>
+          <p:cNvSpPr/>
+          <p:nvPr/>
+        </p:nvSpPr>
+        <p:spPr>
+          <a:xfrm rot="20962550">
+            <a:off x="1968815" y="2807851"/>
+            <a:ext cx="3435340" cy="201207"/>
+          </a:xfrm>
+          <a:prstGeom prst="stripedRightArrow">
+            <a:avLst/>
+          </a:prstGeom>
+        </p:spPr>
+        <p:style>
+          <a:lnRef idx="2">
+            <a:schemeClr val="accent1">
+              <a:shade val="50000"/>
+            </a:schemeClr>
+          </a:lnRef>
+          <a:fillRef idx="1">
+            <a:schemeClr val="accent1"/>
+          </a:fillRef>
+          <a:effectRef idx="0">
+            <a:schemeClr val="accent1"/>
+          </a:effectRef>
+          <a:fontRef idx="minor">
+            <a:schemeClr val="lt1"/>
+          </a:fontRef>
+        </p:style>
+        <p:txBody>
+          <a:bodyPr rtlCol="0" anchor="ctr"/>
+          <a:lstStyle/>
+          <a:p>
+            <a:pPr algn="ctr"/>
+            <a:endParaRPr lang="cs-CZ"/>
+          </a:p>
+        </p:txBody>
+      </p:sp>
+      <p:pic>
+        <p:nvPicPr>
+          <p:cNvPr id="10246" name="Picture 6"/>
+          <p:cNvPicPr>
+            <a:picLocks noChangeAspect="1" noChangeArrowheads="1"/>
+          </p:cNvPicPr>
+          <p:nvPr/>
+        </p:nvPicPr>
+        <p:blipFill>
+          <a:blip r:embed="rId4" cstate="print"/>
+          <a:srcRect/>
+          <a:stretch>
+            <a:fillRect/>
+          </a:stretch>
+        </p:blipFill>
+        <p:spPr bwMode="auto">
+          <a:xfrm>
+            <a:off x="3690689" y="4941168"/>
+            <a:ext cx="5057775" cy="1238250"/>
+          </a:xfrm>
+          <a:prstGeom prst="rect">
+            <a:avLst/>
+          </a:prstGeom>
+          <a:noFill/>
+          <a:ln w="9525">
+            <a:noFill/>
+            <a:miter lim="800000"/>
+            <a:headEnd/>
+            <a:tailEnd/>
+          </a:ln>
+        </p:spPr>
+      </p:pic>
+      <p:sp>
+        <p:nvSpPr>
+          <p:cNvPr id="11" name="Šrafovaná šipka doprava 10"/>
+          <p:cNvSpPr/>
+          <p:nvPr/>
+        </p:nvSpPr>
+        <p:spPr>
+          <a:xfrm>
+            <a:off x="1979712" y="5229200"/>
+            <a:ext cx="1605656" cy="360040"/>
+          </a:xfrm>
+          <a:prstGeom prst="stripedRightArrow">
+            <a:avLst/>
+          </a:prstGeom>
+        </p:spPr>
+        <p:style>
+          <a:lnRef idx="2">
+            <a:schemeClr val="accent1">
+              <a:shade val="50000"/>
+            </a:schemeClr>
+          </a:lnRef>
+          <a:fillRef idx="1">
+            <a:schemeClr val="accent1"/>
+          </a:fillRef>
+          <a:effectRef idx="0">
+            <a:schemeClr val="accent1"/>
+          </a:effectRef>
+          <a:fontRef idx="minor">
+            <a:schemeClr val="lt1"/>
+          </a:fontRef>
+        </p:style>
+        <p:txBody>
+          <a:bodyPr rtlCol="0" anchor="ctr"/>
+          <a:lstStyle/>
+          <a:p>
+            <a:pPr algn="ctr"/>
+            <a:endParaRPr lang="cs-CZ"/>
+          </a:p>
+        </p:txBody>
+      </p:sp>
+    </p:spTree>
+  </p:cSld>
+  <p:clrMapOvr>
+    <a:masterClrMapping/>
+  </p:clrMapOvr>
+  <p:timing>
+    <p:tnLst>
+      <p:par>
+        <p:cTn id="1" dur="indefinite" restart="never" nodeType="tmRoot"/>
+      </p:par>
+    </p:tnLst>
+  </p:timing>
+</p:sld>
+</file>
+
+<file path=ppt/slides/slide18.xml><?xml version="1.0" encoding="utf-8"?>
 <p:sld xmlns:a="http://schemas.openxmlformats.org/drawingml/2006/main" xmlns:r="http://schemas.openxmlformats.org/officeDocument/2006/relationships" xmlns:p="http://schemas.openxmlformats.org/presentationml/2006/main">
   <p:cSld>
     <p:spTree>
@@ -3783,7 +5025,7 @@
         </p:blipFill>
         <p:spPr bwMode="auto">
           <a:xfrm>
-            <a:off x="3923928" y="1484784"/>
+            <a:off x="3923928" y="1772816"/>
             <a:ext cx="3705225" cy="3543300"/>
           </a:xfrm>
           <a:prstGeom prst="rect">
@@ -3898,135 +5140,22 @@
           </a:p>
         </p:txBody>
       </p:sp>
-      <p:sp>
-        <p:nvSpPr>
-          <p:cNvPr id="10" name="Šrafovaná šipka doprava 9"/>
-          <p:cNvSpPr/>
-          <p:nvPr/>
-        </p:nvSpPr>
-        <p:spPr>
-          <a:xfrm rot="1147027">
-            <a:off x="2037422" y="3139776"/>
-            <a:ext cx="4426933" cy="218408"/>
-          </a:xfrm>
-          <a:prstGeom prst="stripedRightArrow">
-            <a:avLst/>
-          </a:prstGeom>
-        </p:spPr>
-        <p:style>
-          <a:lnRef idx="2">
-            <a:schemeClr val="accent1">
-              <a:shade val="50000"/>
-            </a:schemeClr>
-          </a:lnRef>
-          <a:fillRef idx="1">
-            <a:schemeClr val="accent1"/>
-          </a:fillRef>
-          <a:effectRef idx="0">
-            <a:schemeClr val="accent1"/>
-          </a:effectRef>
-          <a:fontRef idx="minor">
-            <a:schemeClr val="lt1"/>
-          </a:fontRef>
-        </p:style>
-        <p:txBody>
-          <a:bodyPr rtlCol="0" anchor="ctr"/>
-          <a:lstStyle/>
-          <a:p>
-            <a:pPr algn="ctr"/>
-            <a:endParaRPr lang="cs-CZ"/>
-          </a:p>
-        </p:txBody>
-      </p:sp>
-      <p:sp>
-        <p:nvSpPr>
-          <p:cNvPr id="11" name="Šrafovaná šipka doprava 10"/>
-          <p:cNvSpPr/>
-          <p:nvPr/>
-        </p:nvSpPr>
-        <p:spPr>
-          <a:xfrm rot="341817">
-            <a:off x="2266581" y="4035768"/>
-            <a:ext cx="2081998" cy="252682"/>
-          </a:xfrm>
-          <a:prstGeom prst="stripedRightArrow">
-            <a:avLst/>
-          </a:prstGeom>
-        </p:spPr>
-        <p:style>
-          <a:lnRef idx="2">
-            <a:schemeClr val="accent1">
-              <a:shade val="50000"/>
-            </a:schemeClr>
-          </a:lnRef>
-          <a:fillRef idx="1">
-            <a:schemeClr val="accent1"/>
-          </a:fillRef>
-          <a:effectRef idx="0">
-            <a:schemeClr val="accent1"/>
-          </a:effectRef>
-          <a:fontRef idx="minor">
-            <a:schemeClr val="lt1"/>
-          </a:fontRef>
-        </p:style>
-        <p:txBody>
-          <a:bodyPr rtlCol="0" anchor="ctr"/>
-          <a:lstStyle/>
-          <a:p>
-            <a:pPr algn="ctr"/>
-            <a:endParaRPr lang="cs-CZ"/>
-          </a:p>
-        </p:txBody>
-      </p:sp>
-      <p:sp>
-        <p:nvSpPr>
-          <p:cNvPr id="12" name="Šrafovaná šipka doprava 11"/>
-          <p:cNvSpPr/>
-          <p:nvPr/>
-        </p:nvSpPr>
-        <p:spPr>
-          <a:xfrm rot="21359301">
-            <a:off x="2558548" y="2554395"/>
-            <a:ext cx="3824134" cy="213150"/>
-          </a:xfrm>
-          <a:prstGeom prst="stripedRightArrow">
-            <a:avLst/>
-          </a:prstGeom>
-        </p:spPr>
-        <p:style>
-          <a:lnRef idx="2">
-            <a:schemeClr val="accent1">
-              <a:shade val="50000"/>
-            </a:schemeClr>
-          </a:lnRef>
-          <a:fillRef idx="1">
-            <a:schemeClr val="accent1"/>
-          </a:fillRef>
-          <a:effectRef idx="0">
-            <a:schemeClr val="accent1"/>
-          </a:effectRef>
-          <a:fontRef idx="minor">
-            <a:schemeClr val="lt1"/>
-          </a:fontRef>
-        </p:style>
-        <p:txBody>
-          <a:bodyPr rtlCol="0" anchor="ctr"/>
-          <a:lstStyle/>
-          <a:p>
-            <a:pPr algn="ctr"/>
-            <a:endParaRPr lang="cs-CZ"/>
-          </a:p>
-        </p:txBody>
-      </p:sp>
     </p:spTree>
   </p:cSld>
   <p:clrMapOvr>
     <a:masterClrMapping/>
   </p:clrMapOvr>
+  <p:timing>
+    <p:tnLst>
+      <p:par>
+        <p:cTn id="1" dur="indefinite" restart="never" nodeType="tmRoot"/>
+      </p:par>
+    </p:tnLst>
+  </p:timing>
 </p:sld>
 </file>
 
-<file path=ppt/slides/slide14.xml><?xml version="1.0" encoding="utf-8"?>
+<file path=ppt/slides/slide19.xml><?xml version="1.0" encoding="utf-8"?>
 <p:sld xmlns:a="http://schemas.openxmlformats.org/drawingml/2006/main" xmlns:r="http://schemas.openxmlformats.org/officeDocument/2006/relationships" xmlns:p="http://schemas.openxmlformats.org/presentationml/2006/main">
   <p:cSld>
     <p:spTree>
@@ -4118,359 +5247,13 @@
   <p:clrMapOvr>
     <a:masterClrMapping/>
   </p:clrMapOvr>
-</p:sld>
-</file>
-
-<file path=ppt/slides/slide15.xml><?xml version="1.0" encoding="utf-8"?>
-<p:sld xmlns:a="http://schemas.openxmlformats.org/drawingml/2006/main" xmlns:r="http://schemas.openxmlformats.org/officeDocument/2006/relationships" xmlns:p="http://schemas.openxmlformats.org/presentationml/2006/main">
-  <p:cSld>
-    <p:spTree>
-      <p:nvGrpSpPr>
-        <p:cNvPr id="1" name=""/>
-        <p:cNvGrpSpPr/>
-        <p:nvPr/>
-      </p:nvGrpSpPr>
-      <p:grpSpPr>
-        <a:xfrm>
-          <a:off x="0" y="0"/>
-          <a:ext cx="0" cy="0"/>
-          <a:chOff x="0" y="0"/>
-          <a:chExt cx="0" cy="0"/>
-        </a:xfrm>
-      </p:grpSpPr>
-      <p:sp>
-        <p:nvSpPr>
-          <p:cNvPr id="2" name="Nadpis 1"/>
-          <p:cNvSpPr>
-            <a:spLocks noGrp="1"/>
-          </p:cNvSpPr>
-          <p:nvPr>
-            <p:ph type="title"/>
-          </p:nvPr>
-        </p:nvSpPr>
-        <p:spPr>
-          <a:xfrm>
-            <a:off x="2267744" y="274638"/>
-            <a:ext cx="6419056" cy="1143000"/>
-          </a:xfrm>
-        </p:spPr>
-        <p:txBody>
-          <a:bodyPr/>
-          <a:lstStyle/>
-          <a:p>
-            <a:r>
-              <a:rPr lang="en-US" dirty="0" smtClean="0"/>
-              <a:t>Osmotic</a:t>
-            </a:r>
-            <a:endParaRPr lang="cs-CZ" dirty="0"/>
-          </a:p>
-        </p:txBody>
-      </p:sp>
-      <p:pic>
-        <p:nvPicPr>
-          <p:cNvPr id="10242" name="Picture 2"/>
-          <p:cNvPicPr>
-            <a:picLocks noChangeAspect="1" noChangeArrowheads="1"/>
-          </p:cNvPicPr>
-          <p:nvPr/>
-        </p:nvPicPr>
-        <p:blipFill>
-          <a:blip r:embed="rId2" cstate="print"/>
-          <a:srcRect/>
-          <a:stretch>
-            <a:fillRect/>
-          </a:stretch>
-        </p:blipFill>
-        <p:spPr bwMode="auto">
-          <a:xfrm>
-            <a:off x="172616" y="848444"/>
-            <a:ext cx="2743200" cy="5676900"/>
-          </a:xfrm>
-          <a:prstGeom prst="rect">
-            <a:avLst/>
-          </a:prstGeom>
-          <a:noFill/>
-          <a:ln w="9525">
-            <a:noFill/>
-            <a:miter lim="800000"/>
-            <a:headEnd/>
-            <a:tailEnd/>
-          </a:ln>
-        </p:spPr>
-      </p:pic>
-      <p:pic>
-        <p:nvPicPr>
-          <p:cNvPr id="10244" name="Picture 4"/>
-          <p:cNvPicPr>
-            <a:picLocks noChangeAspect="1" noChangeArrowheads="1"/>
-          </p:cNvPicPr>
-          <p:nvPr/>
-        </p:nvPicPr>
-        <p:blipFill>
-          <a:blip r:embed="rId3" cstate="print"/>
-          <a:srcRect/>
-          <a:stretch>
-            <a:fillRect/>
-          </a:stretch>
-        </p:blipFill>
-        <p:spPr bwMode="auto">
-          <a:xfrm>
-            <a:off x="3491880" y="1268760"/>
-            <a:ext cx="4629150" cy="1571625"/>
-          </a:xfrm>
-          <a:prstGeom prst="rect">
-            <a:avLst/>
-          </a:prstGeom>
-          <a:noFill/>
-          <a:ln w="9525">
-            <a:noFill/>
-            <a:miter lim="800000"/>
-            <a:headEnd/>
-            <a:tailEnd/>
-          </a:ln>
-        </p:spPr>
-      </p:pic>
-      <p:sp>
-        <p:nvSpPr>
-          <p:cNvPr id="7" name="Šrafovaná šipka doprava 6"/>
-          <p:cNvSpPr/>
-          <p:nvPr/>
-        </p:nvSpPr>
-        <p:spPr>
-          <a:xfrm rot="20274668">
-            <a:off x="1960994" y="2482401"/>
-            <a:ext cx="1605656" cy="213843"/>
-          </a:xfrm>
-          <a:prstGeom prst="stripedRightArrow">
-            <a:avLst/>
-          </a:prstGeom>
-        </p:spPr>
-        <p:style>
-          <a:lnRef idx="2">
-            <a:schemeClr val="accent1">
-              <a:shade val="50000"/>
-            </a:schemeClr>
-          </a:lnRef>
-          <a:fillRef idx="1">
-            <a:schemeClr val="accent1"/>
-          </a:fillRef>
-          <a:effectRef idx="0">
-            <a:schemeClr val="accent1"/>
-          </a:effectRef>
-          <a:fontRef idx="minor">
-            <a:schemeClr val="lt1"/>
-          </a:fontRef>
-        </p:style>
-        <p:txBody>
-          <a:bodyPr rtlCol="0" anchor="ctr"/>
-          <a:lstStyle/>
-          <a:p>
-            <a:pPr algn="ctr"/>
-            <a:endParaRPr lang="cs-CZ"/>
-          </a:p>
-        </p:txBody>
-      </p:sp>
-      <p:sp>
-        <p:nvSpPr>
-          <p:cNvPr id="8" name="Šrafovaná šipka doprava 7"/>
-          <p:cNvSpPr/>
-          <p:nvPr/>
-        </p:nvSpPr>
-        <p:spPr>
-          <a:xfrm rot="20962550">
-            <a:off x="1968815" y="2807851"/>
-            <a:ext cx="3435340" cy="201207"/>
-          </a:xfrm>
-          <a:prstGeom prst="stripedRightArrow">
-            <a:avLst/>
-          </a:prstGeom>
-        </p:spPr>
-        <p:style>
-          <a:lnRef idx="2">
-            <a:schemeClr val="accent1">
-              <a:shade val="50000"/>
-            </a:schemeClr>
-          </a:lnRef>
-          <a:fillRef idx="1">
-            <a:schemeClr val="accent1"/>
-          </a:fillRef>
-          <a:effectRef idx="0">
-            <a:schemeClr val="accent1"/>
-          </a:effectRef>
-          <a:fontRef idx="minor">
-            <a:schemeClr val="lt1"/>
-          </a:fontRef>
-        </p:style>
-        <p:txBody>
-          <a:bodyPr rtlCol="0" anchor="ctr"/>
-          <a:lstStyle/>
-          <a:p>
-            <a:pPr algn="ctr"/>
-            <a:endParaRPr lang="cs-CZ"/>
-          </a:p>
-        </p:txBody>
-      </p:sp>
-      <p:pic>
-        <p:nvPicPr>
-          <p:cNvPr id="10246" name="Picture 6"/>
-          <p:cNvPicPr>
-            <a:picLocks noChangeAspect="1" noChangeArrowheads="1"/>
-          </p:cNvPicPr>
-          <p:nvPr/>
-        </p:nvPicPr>
-        <p:blipFill>
-          <a:blip r:embed="rId4" cstate="print"/>
-          <a:srcRect/>
-          <a:stretch>
-            <a:fillRect/>
-          </a:stretch>
-        </p:blipFill>
-        <p:spPr bwMode="auto">
-          <a:xfrm>
-            <a:off x="3690689" y="4941168"/>
-            <a:ext cx="5057775" cy="1238250"/>
-          </a:xfrm>
-          <a:prstGeom prst="rect">
-            <a:avLst/>
-          </a:prstGeom>
-          <a:noFill/>
-          <a:ln w="9525">
-            <a:noFill/>
-            <a:miter lim="800000"/>
-            <a:headEnd/>
-            <a:tailEnd/>
-          </a:ln>
-        </p:spPr>
-      </p:pic>
-      <p:sp>
-        <p:nvSpPr>
-          <p:cNvPr id="11" name="Šrafovaná šipka doprava 10"/>
-          <p:cNvSpPr/>
-          <p:nvPr/>
-        </p:nvSpPr>
-        <p:spPr>
-          <a:xfrm>
-            <a:off x="1979712" y="5229200"/>
-            <a:ext cx="1605656" cy="360040"/>
-          </a:xfrm>
-          <a:prstGeom prst="stripedRightArrow">
-            <a:avLst/>
-          </a:prstGeom>
-        </p:spPr>
-        <p:style>
-          <a:lnRef idx="2">
-            <a:schemeClr val="accent1">
-              <a:shade val="50000"/>
-            </a:schemeClr>
-          </a:lnRef>
-          <a:fillRef idx="1">
-            <a:schemeClr val="accent1"/>
-          </a:fillRef>
-          <a:effectRef idx="0">
-            <a:schemeClr val="accent1"/>
-          </a:effectRef>
-          <a:fontRef idx="minor">
-            <a:schemeClr val="lt1"/>
-          </a:fontRef>
-        </p:style>
-        <p:txBody>
-          <a:bodyPr rtlCol="0" anchor="ctr"/>
-          <a:lstStyle/>
-          <a:p>
-            <a:pPr algn="ctr"/>
-            <a:endParaRPr lang="cs-CZ"/>
-          </a:p>
-        </p:txBody>
-      </p:sp>
-    </p:spTree>
-  </p:cSld>
-  <p:clrMapOvr>
-    <a:masterClrMapping/>
-  </p:clrMapOvr>
-</p:sld>
-</file>
-
-<file path=ppt/slides/slide16.xml><?xml version="1.0" encoding="utf-8"?>
-<p:sld xmlns:a="http://schemas.openxmlformats.org/drawingml/2006/main" xmlns:r="http://schemas.openxmlformats.org/officeDocument/2006/relationships" xmlns:p="http://schemas.openxmlformats.org/presentationml/2006/main">
-  <p:cSld>
-    <p:spTree>
-      <p:nvGrpSpPr>
-        <p:cNvPr id="1" name=""/>
-        <p:cNvGrpSpPr/>
-        <p:nvPr/>
-      </p:nvGrpSpPr>
-      <p:grpSpPr>
-        <a:xfrm>
-          <a:off x="0" y="0"/>
-          <a:ext cx="0" cy="0"/>
-          <a:chOff x="0" y="0"/>
-          <a:chExt cx="0" cy="0"/>
-        </a:xfrm>
-      </p:grpSpPr>
-      <p:sp>
-        <p:nvSpPr>
-          <p:cNvPr id="2" name="Nadpis 1"/>
-          <p:cNvSpPr>
-            <a:spLocks noGrp="1"/>
-          </p:cNvSpPr>
-          <p:nvPr>
-            <p:ph type="title"/>
-          </p:nvPr>
-        </p:nvSpPr>
-        <p:spPr>
-          <a:xfrm>
-            <a:off x="467544" y="1628800"/>
-            <a:ext cx="8229600" cy="1143000"/>
-          </a:xfrm>
-        </p:spPr>
-        <p:txBody>
-          <a:bodyPr/>
-          <a:lstStyle/>
-          <a:p>
-            <a:r>
-              <a:rPr lang="en-US" dirty="0" smtClean="0"/>
-              <a:t>Thank you for attention!</a:t>
-            </a:r>
-            <a:endParaRPr lang="cs-CZ" dirty="0"/>
-          </a:p>
-        </p:txBody>
-      </p:sp>
-      <p:sp>
-        <p:nvSpPr>
-          <p:cNvPr id="3" name="Zástupný symbol pro obsah 2"/>
-          <p:cNvSpPr>
-            <a:spLocks noGrp="1"/>
-          </p:cNvSpPr>
-          <p:nvPr>
-            <p:ph idx="1"/>
-          </p:nvPr>
-        </p:nvSpPr>
-        <p:spPr>
-          <a:xfrm>
-            <a:off x="5004048" y="6021288"/>
-            <a:ext cx="3898776" cy="604664"/>
-          </a:xfrm>
-        </p:spPr>
-        <p:txBody>
-          <a:bodyPr/>
-          <a:lstStyle/>
-          <a:p>
-            <a:pPr>
-              <a:buNone/>
-            </a:pPr>
-            <a:r>
-              <a:rPr lang="en-US" dirty="0" smtClean="0"/>
-              <a:t>www.physiolibrary.org</a:t>
-            </a:r>
-            <a:endParaRPr lang="cs-CZ" dirty="0"/>
-          </a:p>
-        </p:txBody>
-      </p:sp>
-    </p:spTree>
-  </p:cSld>
-  <p:clrMapOvr>
-    <a:masterClrMapping/>
-  </p:clrMapOvr>
+  <p:timing>
+    <p:tnLst>
+      <p:par>
+        <p:cTn id="1" dur="indefinite" restart="never" nodeType="tmRoot"/>
+      </p:par>
+    </p:tnLst>
+  </p:timing>
 </p:sld>
 </file>
 
@@ -4695,6 +5478,104 @@
   <p:clrMapOvr>
     <a:masterClrMapping/>
   </p:clrMapOvr>
+  <p:timing>
+    <p:tnLst>
+      <p:par>
+        <p:cTn id="1" dur="indefinite" restart="never" nodeType="tmRoot"/>
+      </p:par>
+    </p:tnLst>
+  </p:timing>
+</p:sld>
+</file>
+
+<file path=ppt/slides/slide20.xml><?xml version="1.0" encoding="utf-8"?>
+<p:sld xmlns:a="http://schemas.openxmlformats.org/drawingml/2006/main" xmlns:r="http://schemas.openxmlformats.org/officeDocument/2006/relationships" xmlns:p="http://schemas.openxmlformats.org/presentationml/2006/main">
+  <p:cSld>
+    <p:spTree>
+      <p:nvGrpSpPr>
+        <p:cNvPr id="1" name=""/>
+        <p:cNvGrpSpPr/>
+        <p:nvPr/>
+      </p:nvGrpSpPr>
+      <p:grpSpPr>
+        <a:xfrm>
+          <a:off x="0" y="0"/>
+          <a:ext cx="0" cy="0"/>
+          <a:chOff x="0" y="0"/>
+          <a:chExt cx="0" cy="0"/>
+        </a:xfrm>
+      </p:grpSpPr>
+      <p:sp>
+        <p:nvSpPr>
+          <p:cNvPr id="2" name="Nadpis 1"/>
+          <p:cNvSpPr>
+            <a:spLocks noGrp="1"/>
+          </p:cNvSpPr>
+          <p:nvPr>
+            <p:ph type="title"/>
+          </p:nvPr>
+        </p:nvSpPr>
+        <p:spPr>
+          <a:xfrm>
+            <a:off x="467544" y="1628800"/>
+            <a:ext cx="8229600" cy="1143000"/>
+          </a:xfrm>
+        </p:spPr>
+        <p:txBody>
+          <a:bodyPr/>
+          <a:lstStyle/>
+          <a:p>
+            <a:r>
+              <a:rPr lang="en-US" dirty="0" smtClean="0"/>
+              <a:t>Thank you for your attention!</a:t>
+            </a:r>
+            <a:endParaRPr lang="cs-CZ" dirty="0"/>
+          </a:p>
+        </p:txBody>
+      </p:sp>
+      <p:sp>
+        <p:nvSpPr>
+          <p:cNvPr id="3" name="Zástupný symbol pro obsah 2"/>
+          <p:cNvSpPr>
+            <a:spLocks noGrp="1"/>
+          </p:cNvSpPr>
+          <p:nvPr>
+            <p:ph idx="1"/>
+          </p:nvPr>
+        </p:nvSpPr>
+        <p:spPr>
+          <a:xfrm>
+            <a:off x="5004048" y="6021288"/>
+            <a:ext cx="3898776" cy="604664"/>
+          </a:xfrm>
+        </p:spPr>
+        <p:txBody>
+          <a:bodyPr/>
+          <a:lstStyle/>
+          <a:p>
+            <a:pPr>
+              <a:buNone/>
+            </a:pPr>
+            <a:r>
+              <a:rPr lang="en-US" dirty="0" smtClean="0"/>
+              <a:t>www.physiolibrary.org</a:t>
+            </a:r>
+            <a:endParaRPr lang="cs-CZ" dirty="0"/>
+          </a:p>
+        </p:txBody>
+      </p:sp>
+    </p:spTree>
+  </p:cSld>
+  <p:clrMapOvr>
+    <a:masterClrMapping/>
+  </p:clrMapOvr>
+  <p:timing>
+    <p:tnLst>
+      <p:par>
+        <p:cTn id="1" dur="indefinite" restart="never" nodeType="tmRoot"/>
+      </p:par>
+    </p:tnLst>
+  </p:timing>
 </p:sld>
 </file>
 
@@ -4725,14 +5606,19 @@
             <p:ph type="title"/>
           </p:nvPr>
         </p:nvSpPr>
-        <p:spPr/>
+        <p:spPr>
+          <a:xfrm>
+            <a:off x="467544" y="0"/>
+            <a:ext cx="8229600" cy="1143000"/>
+          </a:xfrm>
+        </p:spPr>
         <p:txBody>
           <a:bodyPr/>
           <a:lstStyle/>
           <a:p>
             <a:r>
               <a:rPr lang="en-US" dirty="0" smtClean="0"/>
-              <a:t>Types</a:t>
+              <a:t>Icons</a:t>
             </a:r>
             <a:endParaRPr lang="cs-CZ" dirty="0"/>
           </a:p>
@@ -4740,7 +5626,7 @@
       </p:sp>
       <p:pic>
         <p:nvPicPr>
-          <p:cNvPr id="1032" name="Picture 8"/>
+          <p:cNvPr id="4099" name="Picture 3"/>
           <p:cNvPicPr>
             <a:picLocks noChangeAspect="1" noChangeArrowheads="1"/>
           </p:cNvPicPr>
@@ -4755,8 +5641,8 @@
         </p:blipFill>
         <p:spPr bwMode="auto">
           <a:xfrm>
-            <a:off x="467544" y="1124744"/>
-            <a:ext cx="2057400" cy="2705100"/>
+            <a:off x="323528" y="932195"/>
+            <a:ext cx="8712968" cy="5925805"/>
           </a:xfrm>
           <a:prstGeom prst="rect">
             <a:avLst/>
@@ -4770,155 +5656,18 @@
           </a:ln>
         </p:spPr>
       </p:pic>
-      <p:pic>
-        <p:nvPicPr>
-          <p:cNvPr id="1033" name="Picture 9"/>
-          <p:cNvPicPr>
-            <a:picLocks noChangeAspect="1" noChangeArrowheads="1"/>
-          </p:cNvPicPr>
-          <p:nvPr/>
-        </p:nvPicPr>
-        <p:blipFill>
-          <a:blip r:embed="rId3" cstate="print"/>
-          <a:srcRect/>
-          <a:stretch>
-            <a:fillRect/>
-          </a:stretch>
-        </p:blipFill>
-        <p:spPr bwMode="auto">
-          <a:xfrm>
-            <a:off x="3419872" y="1489323"/>
-            <a:ext cx="5429250" cy="2371725"/>
-          </a:xfrm>
-          <a:prstGeom prst="rect">
-            <a:avLst/>
-          </a:prstGeom>
-          <a:noFill/>
-          <a:ln w="9525">
-            <a:noFill/>
-            <a:miter lim="800000"/>
-            <a:headEnd/>
-            <a:tailEnd/>
-          </a:ln>
-        </p:spPr>
-      </p:pic>
-      <p:sp>
-        <p:nvSpPr>
-          <p:cNvPr id="12" name="Šrafovaná šipka doprava 11"/>
-          <p:cNvSpPr/>
-          <p:nvPr/>
-        </p:nvSpPr>
-        <p:spPr>
-          <a:xfrm>
-            <a:off x="2699792" y="3284984"/>
-            <a:ext cx="576064" cy="360040"/>
-          </a:xfrm>
-          <a:prstGeom prst="stripedRightArrow">
-            <a:avLst/>
-          </a:prstGeom>
-        </p:spPr>
-        <p:style>
-          <a:lnRef idx="2">
-            <a:schemeClr val="accent1">
-              <a:shade val="50000"/>
-            </a:schemeClr>
-          </a:lnRef>
-          <a:fillRef idx="1">
-            <a:schemeClr val="accent1"/>
-          </a:fillRef>
-          <a:effectRef idx="0">
-            <a:schemeClr val="accent1"/>
-          </a:effectRef>
-          <a:fontRef idx="minor">
-            <a:schemeClr val="lt1"/>
-          </a:fontRef>
-        </p:style>
-        <p:txBody>
-          <a:bodyPr rtlCol="0" anchor="ctr"/>
-          <a:lstStyle/>
-          <a:p>
-            <a:pPr algn="ctr"/>
-            <a:endParaRPr lang="cs-CZ"/>
-          </a:p>
-        </p:txBody>
-      </p:sp>
-      <p:pic>
-        <p:nvPicPr>
-          <p:cNvPr id="1035" name="Picture 11"/>
-          <p:cNvPicPr>
-            <a:picLocks noChangeAspect="1" noChangeArrowheads="1"/>
-          </p:cNvPicPr>
-          <p:nvPr/>
-        </p:nvPicPr>
-        <p:blipFill>
-          <a:blip r:embed="rId4" cstate="print"/>
-          <a:srcRect/>
-          <a:stretch>
-            <a:fillRect/>
-          </a:stretch>
-        </p:blipFill>
-        <p:spPr bwMode="auto">
-          <a:xfrm>
-            <a:off x="1907704" y="4437112"/>
-            <a:ext cx="6896100" cy="1905000"/>
-          </a:xfrm>
-          <a:prstGeom prst="rect">
-            <a:avLst/>
-          </a:prstGeom>
-          <a:noFill/>
-          <a:ln w="9525">
-            <a:noFill/>
-            <a:miter lim="800000"/>
-            <a:headEnd/>
-            <a:tailEnd/>
-          </a:ln>
-        </p:spPr>
-      </p:pic>
-      <p:sp>
-        <p:nvSpPr>
-          <p:cNvPr id="18" name="Šrafovaná šipka doprava 17"/>
-          <p:cNvSpPr/>
-          <p:nvPr/>
-        </p:nvSpPr>
-        <p:spPr>
-          <a:xfrm rot="5400000">
-            <a:off x="4139952" y="3969060"/>
-            <a:ext cx="576064" cy="504056"/>
-          </a:xfrm>
-          <a:prstGeom prst="stripedRightArrow">
-            <a:avLst/>
-          </a:prstGeom>
-        </p:spPr>
-        <p:style>
-          <a:lnRef idx="2">
-            <a:schemeClr val="accent1">
-              <a:shade val="50000"/>
-            </a:schemeClr>
-          </a:lnRef>
-          <a:fillRef idx="1">
-            <a:schemeClr val="accent1"/>
-          </a:fillRef>
-          <a:effectRef idx="0">
-            <a:schemeClr val="accent1"/>
-          </a:effectRef>
-          <a:fontRef idx="minor">
-            <a:schemeClr val="lt1"/>
-          </a:fontRef>
-        </p:style>
-        <p:txBody>
-          <a:bodyPr rtlCol="0" anchor="ctr"/>
-          <a:lstStyle/>
-          <a:p>
-            <a:pPr algn="ctr"/>
-            <a:endParaRPr lang="cs-CZ"/>
-          </a:p>
-        </p:txBody>
-      </p:sp>
     </p:spTree>
   </p:cSld>
   <p:clrMapOvr>
     <a:masterClrMapping/>
   </p:clrMapOvr>
+  <p:timing>
+    <p:tnLst>
+      <p:par>
+        <p:cTn id="1" dur="indefinite" restart="never" nodeType="tmRoot"/>
+      </p:par>
+    </p:tnLst>
+  </p:timing>
 </p:sld>
 </file>
 
@@ -4949,14 +5698,19 @@
             <p:ph type="title"/>
           </p:nvPr>
         </p:nvSpPr>
-        <p:spPr/>
+        <p:spPr>
+          <a:xfrm>
+            <a:off x="457200" y="274638"/>
+            <a:ext cx="5050904" cy="1143000"/>
+          </a:xfrm>
+        </p:spPr>
         <p:txBody>
           <a:bodyPr/>
           <a:lstStyle/>
           <a:p>
             <a:r>
               <a:rPr lang="en-US" dirty="0" err="1" smtClean="0"/>
-              <a:t>Types.Constants</a:t>
+              <a:t>Blocks.Factors</a:t>
             </a:r>
             <a:endParaRPr lang="cs-CZ" dirty="0"/>
           </a:p>
@@ -4964,7 +5718,7 @@
       </p:sp>
       <p:pic>
         <p:nvPicPr>
-          <p:cNvPr id="3077" name="Picture 5"/>
+          <p:cNvPr id="5123" name="Picture 3"/>
           <p:cNvPicPr>
             <a:picLocks noChangeAspect="1" noChangeArrowheads="1"/>
           </p:cNvPicPr>
@@ -4979,8 +5733,8 @@
         </p:blipFill>
         <p:spPr bwMode="auto">
           <a:xfrm>
-            <a:off x="2699792" y="1412776"/>
-            <a:ext cx="6276975" cy="4543425"/>
+            <a:off x="395536" y="1484784"/>
+            <a:ext cx="2257425" cy="4705350"/>
           </a:xfrm>
           <a:prstGeom prst="rect">
             <a:avLst/>
@@ -4996,7 +5750,7 @@
       </p:pic>
       <p:pic>
         <p:nvPicPr>
-          <p:cNvPr id="3080" name="Picture 8"/>
+          <p:cNvPr id="5124" name="Picture 4"/>
           <p:cNvPicPr>
             <a:picLocks noChangeAspect="1" noChangeArrowheads="1"/>
           </p:cNvPicPr>
@@ -5011,8 +5765,8 @@
         </p:blipFill>
         <p:spPr bwMode="auto">
           <a:xfrm>
-            <a:off x="179512" y="1124744"/>
-            <a:ext cx="2085975" cy="3143250"/>
+            <a:off x="5364088" y="332656"/>
+            <a:ext cx="3324225" cy="6143625"/>
           </a:xfrm>
           <a:prstGeom prst="rect">
             <a:avLst/>
@@ -5028,14 +5782,14 @@
       </p:pic>
       <p:sp>
         <p:nvSpPr>
-          <p:cNvPr id="12" name="Šrafovaná šipka doprava 11"/>
+          <p:cNvPr id="7" name="Šrafovaná šipka doprava 6"/>
           <p:cNvSpPr/>
           <p:nvPr/>
         </p:nvSpPr>
         <p:spPr>
-          <a:xfrm>
-            <a:off x="2411760" y="3861048"/>
-            <a:ext cx="576064" cy="288032"/>
+          <a:xfrm rot="19359818">
+            <a:off x="3012318" y="3841206"/>
+            <a:ext cx="1812085" cy="1224136"/>
           </a:xfrm>
           <a:prstGeom prst="stripedRightArrow">
             <a:avLst/>
@@ -5066,83 +5820,18 @@
           </a:p>
         </p:txBody>
       </p:sp>
-      <p:sp>
-        <p:nvSpPr>
-          <p:cNvPr id="13" name="Šrafovaná šipka doprava 12"/>
-          <p:cNvSpPr/>
-          <p:nvPr/>
-        </p:nvSpPr>
-        <p:spPr>
-          <a:xfrm rot="5400000">
-            <a:off x="3599892" y="5409220"/>
-            <a:ext cx="1080120" cy="432048"/>
-          </a:xfrm>
-          <a:prstGeom prst="stripedRightArrow">
-            <a:avLst/>
-          </a:prstGeom>
-        </p:spPr>
-        <p:style>
-          <a:lnRef idx="2">
-            <a:schemeClr val="accent1">
-              <a:shade val="50000"/>
-            </a:schemeClr>
-          </a:lnRef>
-          <a:fillRef idx="1">
-            <a:schemeClr val="accent1"/>
-          </a:fillRef>
-          <a:effectRef idx="0">
-            <a:schemeClr val="accent1"/>
-          </a:effectRef>
-          <a:fontRef idx="minor">
-            <a:schemeClr val="lt1"/>
-          </a:fontRef>
-        </p:style>
-        <p:txBody>
-          <a:bodyPr rtlCol="0" anchor="ctr"/>
-          <a:lstStyle/>
-          <a:p>
-            <a:pPr algn="ctr"/>
-            <a:endParaRPr lang="cs-CZ"/>
-          </a:p>
-        </p:txBody>
-      </p:sp>
-      <p:pic>
-        <p:nvPicPr>
-          <p:cNvPr id="3081" name="Picture 9"/>
-          <p:cNvPicPr>
-            <a:picLocks noChangeAspect="1" noChangeArrowheads="1"/>
-          </p:cNvPicPr>
-          <p:nvPr/>
-        </p:nvPicPr>
-        <p:blipFill>
-          <a:blip r:embed="rId4" cstate="print"/>
-          <a:srcRect/>
-          <a:stretch>
-            <a:fillRect/>
-          </a:stretch>
-        </p:blipFill>
-        <p:spPr bwMode="auto">
-          <a:xfrm>
-            <a:off x="827584" y="6197302"/>
-            <a:ext cx="6791325" cy="400050"/>
-          </a:xfrm>
-          <a:prstGeom prst="rect">
-            <a:avLst/>
-          </a:prstGeom>
-          <a:noFill/>
-          <a:ln w="9525">
-            <a:noFill/>
-            <a:miter lim="800000"/>
-            <a:headEnd/>
-            <a:tailEnd/>
-          </a:ln>
-        </p:spPr>
-      </p:pic>
     </p:spTree>
   </p:cSld>
   <p:clrMapOvr>
     <a:masterClrMapping/>
   </p:clrMapOvr>
+  <p:timing>
+    <p:tnLst>
+      <p:par>
+        <p:cTn id="1" dur="indefinite" restart="never" nodeType="tmRoot"/>
+      </p:par>
+    </p:tnLst>
+  </p:timing>
 </p:sld>
 </file>
 
@@ -5180,9 +5869,480 @@
           <a:p>
             <a:r>
               <a:rPr lang="en-US" dirty="0" smtClean="0"/>
-              <a:t>RECIPROCAL TYPES</a:t>
+              <a:t>Types</a:t>
             </a:r>
             <a:endParaRPr lang="cs-CZ" dirty="0"/>
+          </a:p>
+        </p:txBody>
+      </p:sp>
+      <p:pic>
+        <p:nvPicPr>
+          <p:cNvPr id="1032" name="Picture 8"/>
+          <p:cNvPicPr>
+            <a:picLocks noChangeAspect="1" noChangeArrowheads="1"/>
+          </p:cNvPicPr>
+          <p:nvPr/>
+        </p:nvPicPr>
+        <p:blipFill>
+          <a:blip r:embed="rId2" cstate="print"/>
+          <a:srcRect/>
+          <a:stretch>
+            <a:fillRect/>
+          </a:stretch>
+        </p:blipFill>
+        <p:spPr bwMode="auto">
+          <a:xfrm>
+            <a:off x="467544" y="1124744"/>
+            <a:ext cx="2057400" cy="2705100"/>
+          </a:xfrm>
+          <a:prstGeom prst="rect">
+            <a:avLst/>
+          </a:prstGeom>
+          <a:noFill/>
+          <a:ln w="9525">
+            <a:noFill/>
+            <a:miter lim="800000"/>
+            <a:headEnd/>
+            <a:tailEnd/>
+          </a:ln>
+        </p:spPr>
+      </p:pic>
+      <p:pic>
+        <p:nvPicPr>
+          <p:cNvPr id="1033" name="Picture 9"/>
+          <p:cNvPicPr>
+            <a:picLocks noChangeAspect="1" noChangeArrowheads="1"/>
+          </p:cNvPicPr>
+          <p:nvPr/>
+        </p:nvPicPr>
+        <p:blipFill>
+          <a:blip r:embed="rId3" cstate="print"/>
+          <a:srcRect/>
+          <a:stretch>
+            <a:fillRect/>
+          </a:stretch>
+        </p:blipFill>
+        <p:spPr bwMode="auto">
+          <a:xfrm>
+            <a:off x="3419872" y="1489323"/>
+            <a:ext cx="5429250" cy="2371725"/>
+          </a:xfrm>
+          <a:prstGeom prst="rect">
+            <a:avLst/>
+          </a:prstGeom>
+          <a:noFill/>
+          <a:ln w="9525">
+            <a:noFill/>
+            <a:miter lim="800000"/>
+            <a:headEnd/>
+            <a:tailEnd/>
+          </a:ln>
+        </p:spPr>
+      </p:pic>
+      <p:sp>
+        <p:nvSpPr>
+          <p:cNvPr id="12" name="Šrafovaná šipka doprava 11"/>
+          <p:cNvSpPr/>
+          <p:nvPr/>
+        </p:nvSpPr>
+        <p:spPr>
+          <a:xfrm>
+            <a:off x="2699792" y="3284984"/>
+            <a:ext cx="576064" cy="360040"/>
+          </a:xfrm>
+          <a:prstGeom prst="stripedRightArrow">
+            <a:avLst/>
+          </a:prstGeom>
+        </p:spPr>
+        <p:style>
+          <a:lnRef idx="2">
+            <a:schemeClr val="accent1">
+              <a:shade val="50000"/>
+            </a:schemeClr>
+          </a:lnRef>
+          <a:fillRef idx="1">
+            <a:schemeClr val="accent1"/>
+          </a:fillRef>
+          <a:effectRef idx="0">
+            <a:schemeClr val="accent1"/>
+          </a:effectRef>
+          <a:fontRef idx="minor">
+            <a:schemeClr val="lt1"/>
+          </a:fontRef>
+        </p:style>
+        <p:txBody>
+          <a:bodyPr rtlCol="0" anchor="ctr"/>
+          <a:lstStyle/>
+          <a:p>
+            <a:pPr algn="ctr"/>
+            <a:endParaRPr lang="cs-CZ"/>
+          </a:p>
+        </p:txBody>
+      </p:sp>
+      <p:pic>
+        <p:nvPicPr>
+          <p:cNvPr id="1035" name="Picture 11"/>
+          <p:cNvPicPr>
+            <a:picLocks noChangeAspect="1" noChangeArrowheads="1"/>
+          </p:cNvPicPr>
+          <p:nvPr/>
+        </p:nvPicPr>
+        <p:blipFill>
+          <a:blip r:embed="rId4" cstate="print"/>
+          <a:srcRect/>
+          <a:stretch>
+            <a:fillRect/>
+          </a:stretch>
+        </p:blipFill>
+        <p:spPr bwMode="auto">
+          <a:xfrm>
+            <a:off x="1907704" y="4437112"/>
+            <a:ext cx="6896100" cy="1905000"/>
+          </a:xfrm>
+          <a:prstGeom prst="rect">
+            <a:avLst/>
+          </a:prstGeom>
+          <a:noFill/>
+          <a:ln w="9525">
+            <a:noFill/>
+            <a:miter lim="800000"/>
+            <a:headEnd/>
+            <a:tailEnd/>
+          </a:ln>
+        </p:spPr>
+      </p:pic>
+      <p:sp>
+        <p:nvSpPr>
+          <p:cNvPr id="18" name="Šrafovaná šipka doprava 17"/>
+          <p:cNvSpPr/>
+          <p:nvPr/>
+        </p:nvSpPr>
+        <p:spPr>
+          <a:xfrm rot="5400000">
+            <a:off x="4139952" y="3969060"/>
+            <a:ext cx="576064" cy="504056"/>
+          </a:xfrm>
+          <a:prstGeom prst="stripedRightArrow">
+            <a:avLst/>
+          </a:prstGeom>
+        </p:spPr>
+        <p:style>
+          <a:lnRef idx="2">
+            <a:schemeClr val="accent1">
+              <a:shade val="50000"/>
+            </a:schemeClr>
+          </a:lnRef>
+          <a:fillRef idx="1">
+            <a:schemeClr val="accent1"/>
+          </a:fillRef>
+          <a:effectRef idx="0">
+            <a:schemeClr val="accent1"/>
+          </a:effectRef>
+          <a:fontRef idx="minor">
+            <a:schemeClr val="lt1"/>
+          </a:fontRef>
+        </p:style>
+        <p:txBody>
+          <a:bodyPr rtlCol="0" anchor="ctr"/>
+          <a:lstStyle/>
+          <a:p>
+            <a:pPr algn="ctr"/>
+            <a:endParaRPr lang="cs-CZ"/>
+          </a:p>
+        </p:txBody>
+      </p:sp>
+    </p:spTree>
+  </p:cSld>
+  <p:clrMapOvr>
+    <a:masterClrMapping/>
+  </p:clrMapOvr>
+  <p:timing>
+    <p:tnLst>
+      <p:par>
+        <p:cTn id="1" dur="indefinite" restart="never" nodeType="tmRoot"/>
+      </p:par>
+    </p:tnLst>
+  </p:timing>
+</p:sld>
+</file>
+
+<file path=ppt/slides/slide6.xml><?xml version="1.0" encoding="utf-8"?>
+<p:sld xmlns:a="http://schemas.openxmlformats.org/drawingml/2006/main" xmlns:r="http://schemas.openxmlformats.org/officeDocument/2006/relationships" xmlns:p="http://schemas.openxmlformats.org/presentationml/2006/main" show="0">
+  <p:cSld>
+    <p:spTree>
+      <p:nvGrpSpPr>
+        <p:cNvPr id="1" name=""/>
+        <p:cNvGrpSpPr/>
+        <p:nvPr/>
+      </p:nvGrpSpPr>
+      <p:grpSpPr>
+        <a:xfrm>
+          <a:off x="0" y="0"/>
+          <a:ext cx="0" cy="0"/>
+          <a:chOff x="0" y="0"/>
+          <a:chExt cx="0" cy="0"/>
+        </a:xfrm>
+      </p:grpSpPr>
+      <p:sp>
+        <p:nvSpPr>
+          <p:cNvPr id="2" name="Nadpis 1"/>
+          <p:cNvSpPr>
+            <a:spLocks noGrp="1"/>
+          </p:cNvSpPr>
+          <p:nvPr>
+            <p:ph type="title"/>
+          </p:nvPr>
+        </p:nvSpPr>
+        <p:spPr/>
+        <p:txBody>
+          <a:bodyPr/>
+          <a:lstStyle/>
+          <a:p>
+            <a:r>
+              <a:rPr lang="en-US" dirty="0" err="1" smtClean="0"/>
+              <a:t>Types.Constants</a:t>
+            </a:r>
+            <a:endParaRPr lang="cs-CZ" dirty="0"/>
+          </a:p>
+        </p:txBody>
+      </p:sp>
+      <p:pic>
+        <p:nvPicPr>
+          <p:cNvPr id="3077" name="Picture 5"/>
+          <p:cNvPicPr>
+            <a:picLocks noChangeAspect="1" noChangeArrowheads="1"/>
+          </p:cNvPicPr>
+          <p:nvPr/>
+        </p:nvPicPr>
+        <p:blipFill>
+          <a:blip r:embed="rId2" cstate="print"/>
+          <a:srcRect/>
+          <a:stretch>
+            <a:fillRect/>
+          </a:stretch>
+        </p:blipFill>
+        <p:spPr bwMode="auto">
+          <a:xfrm>
+            <a:off x="2699792" y="1412776"/>
+            <a:ext cx="6276975" cy="4543425"/>
+          </a:xfrm>
+          <a:prstGeom prst="rect">
+            <a:avLst/>
+          </a:prstGeom>
+          <a:noFill/>
+          <a:ln w="9525">
+            <a:noFill/>
+            <a:miter lim="800000"/>
+            <a:headEnd/>
+            <a:tailEnd/>
+          </a:ln>
+        </p:spPr>
+      </p:pic>
+      <p:pic>
+        <p:nvPicPr>
+          <p:cNvPr id="3080" name="Picture 8"/>
+          <p:cNvPicPr>
+            <a:picLocks noChangeAspect="1" noChangeArrowheads="1"/>
+          </p:cNvPicPr>
+          <p:nvPr/>
+        </p:nvPicPr>
+        <p:blipFill>
+          <a:blip r:embed="rId3" cstate="print"/>
+          <a:srcRect/>
+          <a:stretch>
+            <a:fillRect/>
+          </a:stretch>
+        </p:blipFill>
+        <p:spPr bwMode="auto">
+          <a:xfrm>
+            <a:off x="179512" y="1124744"/>
+            <a:ext cx="2085975" cy="3143250"/>
+          </a:xfrm>
+          <a:prstGeom prst="rect">
+            <a:avLst/>
+          </a:prstGeom>
+          <a:noFill/>
+          <a:ln w="9525">
+            <a:noFill/>
+            <a:miter lim="800000"/>
+            <a:headEnd/>
+            <a:tailEnd/>
+          </a:ln>
+        </p:spPr>
+      </p:pic>
+      <p:sp>
+        <p:nvSpPr>
+          <p:cNvPr id="12" name="Šrafovaná šipka doprava 11"/>
+          <p:cNvSpPr/>
+          <p:nvPr/>
+        </p:nvSpPr>
+        <p:spPr>
+          <a:xfrm>
+            <a:off x="2411760" y="3861048"/>
+            <a:ext cx="576064" cy="288032"/>
+          </a:xfrm>
+          <a:prstGeom prst="stripedRightArrow">
+            <a:avLst/>
+          </a:prstGeom>
+        </p:spPr>
+        <p:style>
+          <a:lnRef idx="2">
+            <a:schemeClr val="accent1">
+              <a:shade val="50000"/>
+            </a:schemeClr>
+          </a:lnRef>
+          <a:fillRef idx="1">
+            <a:schemeClr val="accent1"/>
+          </a:fillRef>
+          <a:effectRef idx="0">
+            <a:schemeClr val="accent1"/>
+          </a:effectRef>
+          <a:fontRef idx="minor">
+            <a:schemeClr val="lt1"/>
+          </a:fontRef>
+        </p:style>
+        <p:txBody>
+          <a:bodyPr rtlCol="0" anchor="ctr"/>
+          <a:lstStyle/>
+          <a:p>
+            <a:pPr algn="ctr"/>
+            <a:endParaRPr lang="cs-CZ"/>
+          </a:p>
+        </p:txBody>
+      </p:sp>
+      <p:sp>
+        <p:nvSpPr>
+          <p:cNvPr id="13" name="Šrafovaná šipka doprava 12"/>
+          <p:cNvSpPr/>
+          <p:nvPr/>
+        </p:nvSpPr>
+        <p:spPr>
+          <a:xfrm rot="5400000">
+            <a:off x="3599892" y="5409220"/>
+            <a:ext cx="1080120" cy="432048"/>
+          </a:xfrm>
+          <a:prstGeom prst="stripedRightArrow">
+            <a:avLst/>
+          </a:prstGeom>
+        </p:spPr>
+        <p:style>
+          <a:lnRef idx="2">
+            <a:schemeClr val="accent1">
+              <a:shade val="50000"/>
+            </a:schemeClr>
+          </a:lnRef>
+          <a:fillRef idx="1">
+            <a:schemeClr val="accent1"/>
+          </a:fillRef>
+          <a:effectRef idx="0">
+            <a:schemeClr val="accent1"/>
+          </a:effectRef>
+          <a:fontRef idx="minor">
+            <a:schemeClr val="lt1"/>
+          </a:fontRef>
+        </p:style>
+        <p:txBody>
+          <a:bodyPr rtlCol="0" anchor="ctr"/>
+          <a:lstStyle/>
+          <a:p>
+            <a:pPr algn="ctr"/>
+            <a:endParaRPr lang="cs-CZ"/>
+          </a:p>
+        </p:txBody>
+      </p:sp>
+      <p:pic>
+        <p:nvPicPr>
+          <p:cNvPr id="3081" name="Picture 9"/>
+          <p:cNvPicPr>
+            <a:picLocks noChangeAspect="1" noChangeArrowheads="1"/>
+          </p:cNvPicPr>
+          <p:nvPr/>
+        </p:nvPicPr>
+        <p:blipFill>
+          <a:blip r:embed="rId4" cstate="print"/>
+          <a:srcRect/>
+          <a:stretch>
+            <a:fillRect/>
+          </a:stretch>
+        </p:blipFill>
+        <p:spPr bwMode="auto">
+          <a:xfrm>
+            <a:off x="827584" y="6197302"/>
+            <a:ext cx="6791325" cy="400050"/>
+          </a:xfrm>
+          <a:prstGeom prst="rect">
+            <a:avLst/>
+          </a:prstGeom>
+          <a:noFill/>
+          <a:ln w="9525">
+            <a:noFill/>
+            <a:miter lim="800000"/>
+            <a:headEnd/>
+            <a:tailEnd/>
+          </a:ln>
+        </p:spPr>
+      </p:pic>
+    </p:spTree>
+  </p:cSld>
+  <p:clrMapOvr>
+    <a:masterClrMapping/>
+  </p:clrMapOvr>
+  <p:transition/>
+  <p:timing>
+    <p:tnLst>
+      <p:par>
+        <p:cTn id="1" dur="indefinite" restart="never" nodeType="tmRoot"/>
+      </p:par>
+    </p:tnLst>
+  </p:timing>
+</p:sld>
+</file>
+
+<file path=ppt/slides/slide7.xml><?xml version="1.0" encoding="utf-8"?>
+<p:sld xmlns:a="http://schemas.openxmlformats.org/drawingml/2006/main" xmlns:r="http://schemas.openxmlformats.org/officeDocument/2006/relationships" xmlns:p="http://schemas.openxmlformats.org/presentationml/2006/main" show="0">
+  <p:cSld>
+    <p:spTree>
+      <p:nvGrpSpPr>
+        <p:cNvPr id="1" name=""/>
+        <p:cNvGrpSpPr/>
+        <p:nvPr/>
+      </p:nvGrpSpPr>
+      <p:grpSpPr>
+        <a:xfrm>
+          <a:off x="0" y="0"/>
+          <a:ext cx="0" cy="0"/>
+          <a:chOff x="0" y="0"/>
+          <a:chExt cx="0" cy="0"/>
+        </a:xfrm>
+      </p:grpSpPr>
+      <p:sp>
+        <p:nvSpPr>
+          <p:cNvPr id="2" name="Nadpis 1"/>
+          <p:cNvSpPr>
+            <a:spLocks noGrp="1"/>
+          </p:cNvSpPr>
+          <p:nvPr>
+            <p:ph type="title"/>
+          </p:nvPr>
+        </p:nvSpPr>
+        <p:spPr/>
+        <p:txBody>
+          <a:bodyPr/>
+          <a:lstStyle/>
+          <a:p>
+            <a:r>
+              <a:rPr lang="en-US" cap="all" dirty="0" smtClean="0"/>
+              <a:t>reciprocal</a:t>
+            </a:r>
+            <a:r>
+              <a:rPr lang="en-US" dirty="0" smtClean="0"/>
+              <a:t> </a:t>
+            </a:r>
+            <a:r>
+              <a:rPr lang="en-US" cap="all" dirty="0" smtClean="0"/>
+              <a:t>physical quantities</a:t>
+            </a:r>
+            <a:endParaRPr lang="cs-CZ" cap="all" dirty="0"/>
           </a:p>
         </p:txBody>
       </p:sp>
@@ -5210,35 +6370,16 @@
           <a:p>
             <a:r>
               <a:rPr lang="en-US" dirty="0" smtClean="0"/>
-              <a:t>Physiolibrary 2.1 fully supports </a:t>
-            </a:r>
-            <a:r>
-              <a:rPr lang="en-US" b="1" dirty="0" smtClean="0"/>
-              <a:t>only</a:t>
-            </a:r>
-            <a:r>
-              <a:rPr lang="en-US" dirty="0" smtClean="0"/>
-              <a:t> </a:t>
-            </a:r>
-            <a:r>
-              <a:rPr lang="en-US" b="1" dirty="0" smtClean="0"/>
-              <a:t>generic</a:t>
-            </a:r>
-            <a:r>
-              <a:rPr lang="en-US" dirty="0" smtClean="0"/>
-              <a:t> types!</a:t>
-            </a:r>
-          </a:p>
-          <a:p>
-            <a:pPr>
-              <a:buNone/>
-            </a:pPr>
+              <a:t>Users are accustomed to use any physical quantity.</a:t>
+            </a:r>
+          </a:p>
+          <a:p>
             <a:endParaRPr lang="en-US" dirty="0" smtClean="0"/>
           </a:p>
           <a:p>
             <a:r>
               <a:rPr lang="en-US" i="1" dirty="0" smtClean="0"/>
-              <a:t>May be the reciprocal types should be supported by Modelica Environments (like display units)?  </a:t>
+              <a:t>May be the reciprocal quantities should be supported by Modelica Environments (like display units)?  </a:t>
             </a:r>
             <a:endParaRPr lang="cs-CZ" i="1" dirty="0"/>
           </a:p>
@@ -5274,15 +6415,11 @@
                     <a:p>
                       <a:r>
                         <a:rPr lang="en-US" dirty="0" smtClean="0"/>
-                        <a:t>Generic Type</a:t>
+                        <a:t>Selected Quantity</a:t>
                       </a:r>
                       <a:r>
                         <a:rPr lang="en-US" baseline="0" dirty="0" smtClean="0"/>
-                        <a:t>  .. </a:t>
-                      </a:r>
-                      <a:r>
-                        <a:rPr lang="en-US" dirty="0" smtClean="0"/>
-                        <a:t>T</a:t>
+                        <a:t> .. Q</a:t>
                       </a:r>
                       <a:endParaRPr lang="cs-CZ" dirty="0"/>
                     </a:p>
@@ -5296,7 +6433,7 @@
                     <a:p>
                       <a:r>
                         <a:rPr lang="en-US" dirty="0" smtClean="0"/>
-                        <a:t>Reciprocal Type .. 1/T</a:t>
+                        <a:t>Reciprocal Quantity .. 1/Q</a:t>
                       </a:r>
                       <a:endParaRPr lang="cs-CZ" dirty="0"/>
                     </a:p>
@@ -5471,248 +6608,14 @@
   <p:clrMapOvr>
     <a:masterClrMapping/>
   </p:clrMapOvr>
-</p:sld>
-</file>
-
-<file path=ppt/slides/slide6.xml><?xml version="1.0" encoding="utf-8"?>
-<p:sld xmlns:a="http://schemas.openxmlformats.org/drawingml/2006/main" xmlns:r="http://schemas.openxmlformats.org/officeDocument/2006/relationships" xmlns:p="http://schemas.openxmlformats.org/presentationml/2006/main">
-  <p:cSld>
-    <p:spTree>
-      <p:nvGrpSpPr>
-        <p:cNvPr id="1" name=""/>
-        <p:cNvGrpSpPr/>
-        <p:nvPr/>
-      </p:nvGrpSpPr>
-      <p:grpSpPr>
-        <a:xfrm>
-          <a:off x="0" y="0"/>
-          <a:ext cx="0" cy="0"/>
-          <a:chOff x="0" y="0"/>
-          <a:chExt cx="0" cy="0"/>
-        </a:xfrm>
-      </p:grpSpPr>
-      <p:sp>
-        <p:nvSpPr>
-          <p:cNvPr id="2" name="Nadpis 1"/>
-          <p:cNvSpPr>
-            <a:spLocks noGrp="1"/>
-          </p:cNvSpPr>
-          <p:nvPr>
-            <p:ph type="title"/>
-          </p:nvPr>
-        </p:nvSpPr>
-        <p:spPr>
-          <a:xfrm>
-            <a:off x="467544" y="0"/>
-            <a:ext cx="8229600" cy="1143000"/>
-          </a:xfrm>
-        </p:spPr>
-        <p:txBody>
-          <a:bodyPr/>
-          <a:lstStyle/>
-          <a:p>
-            <a:r>
-              <a:rPr lang="en-US" dirty="0" smtClean="0"/>
-              <a:t>Icons</a:t>
-            </a:r>
-            <a:endParaRPr lang="cs-CZ" dirty="0"/>
-          </a:p>
-        </p:txBody>
-      </p:sp>
-      <p:pic>
-        <p:nvPicPr>
-          <p:cNvPr id="4099" name="Picture 3"/>
-          <p:cNvPicPr>
-            <a:picLocks noChangeAspect="1" noChangeArrowheads="1"/>
-          </p:cNvPicPr>
-          <p:nvPr/>
-        </p:nvPicPr>
-        <p:blipFill>
-          <a:blip r:embed="rId2" cstate="print"/>
-          <a:srcRect/>
-          <a:stretch>
-            <a:fillRect/>
-          </a:stretch>
-        </p:blipFill>
-        <p:spPr bwMode="auto">
-          <a:xfrm>
-            <a:off x="323528" y="932195"/>
-            <a:ext cx="8712968" cy="5925805"/>
-          </a:xfrm>
-          <a:prstGeom prst="rect">
-            <a:avLst/>
-          </a:prstGeom>
-          <a:noFill/>
-          <a:ln w="9525">
-            <a:noFill/>
-            <a:miter lim="800000"/>
-            <a:headEnd/>
-            <a:tailEnd/>
-          </a:ln>
-        </p:spPr>
-      </p:pic>
-    </p:spTree>
-  </p:cSld>
-  <p:clrMapOvr>
-    <a:masterClrMapping/>
-  </p:clrMapOvr>
-</p:sld>
-</file>
-
-<file path=ppt/slides/slide7.xml><?xml version="1.0" encoding="utf-8"?>
-<p:sld xmlns:a="http://schemas.openxmlformats.org/drawingml/2006/main" xmlns:r="http://schemas.openxmlformats.org/officeDocument/2006/relationships" xmlns:p="http://schemas.openxmlformats.org/presentationml/2006/main">
-  <p:cSld>
-    <p:spTree>
-      <p:nvGrpSpPr>
-        <p:cNvPr id="1" name=""/>
-        <p:cNvGrpSpPr/>
-        <p:nvPr/>
-      </p:nvGrpSpPr>
-      <p:grpSpPr>
-        <a:xfrm>
-          <a:off x="0" y="0"/>
-          <a:ext cx="0" cy="0"/>
-          <a:chOff x="0" y="0"/>
-          <a:chExt cx="0" cy="0"/>
-        </a:xfrm>
-      </p:grpSpPr>
-      <p:sp>
-        <p:nvSpPr>
-          <p:cNvPr id="2" name="Nadpis 1"/>
-          <p:cNvSpPr>
-            <a:spLocks noGrp="1"/>
-          </p:cNvSpPr>
-          <p:nvPr>
-            <p:ph type="title"/>
-          </p:nvPr>
-        </p:nvSpPr>
-        <p:spPr>
-          <a:xfrm>
-            <a:off x="457200" y="274638"/>
-            <a:ext cx="5050904" cy="1143000"/>
-          </a:xfrm>
-        </p:spPr>
-        <p:txBody>
-          <a:bodyPr/>
-          <a:lstStyle/>
-          <a:p>
-            <a:r>
-              <a:rPr lang="en-US" dirty="0" err="1" smtClean="0"/>
-              <a:t>Blocks.Factors</a:t>
-            </a:r>
-            <a:endParaRPr lang="cs-CZ" dirty="0"/>
-          </a:p>
-        </p:txBody>
-      </p:sp>
-      <p:pic>
-        <p:nvPicPr>
-          <p:cNvPr id="5123" name="Picture 3"/>
-          <p:cNvPicPr>
-            <a:picLocks noChangeAspect="1" noChangeArrowheads="1"/>
-          </p:cNvPicPr>
-          <p:nvPr/>
-        </p:nvPicPr>
-        <p:blipFill>
-          <a:blip r:embed="rId2" cstate="print"/>
-          <a:srcRect/>
-          <a:stretch>
-            <a:fillRect/>
-          </a:stretch>
-        </p:blipFill>
-        <p:spPr bwMode="auto">
-          <a:xfrm>
-            <a:off x="395536" y="1484784"/>
-            <a:ext cx="2257425" cy="4705350"/>
-          </a:xfrm>
-          <a:prstGeom prst="rect">
-            <a:avLst/>
-          </a:prstGeom>
-          <a:noFill/>
-          <a:ln w="9525">
-            <a:noFill/>
-            <a:miter lim="800000"/>
-            <a:headEnd/>
-            <a:tailEnd/>
-          </a:ln>
-        </p:spPr>
-      </p:pic>
-      <p:pic>
-        <p:nvPicPr>
-          <p:cNvPr id="5124" name="Picture 4"/>
-          <p:cNvPicPr>
-            <a:picLocks noChangeAspect="1" noChangeArrowheads="1"/>
-          </p:cNvPicPr>
-          <p:nvPr/>
-        </p:nvPicPr>
-        <p:blipFill>
-          <a:blip r:embed="rId3" cstate="print"/>
-          <a:srcRect/>
-          <a:stretch>
-            <a:fillRect/>
-          </a:stretch>
-        </p:blipFill>
-        <p:spPr bwMode="auto">
-          <a:xfrm>
-            <a:off x="5364088" y="332656"/>
-            <a:ext cx="3324225" cy="6143625"/>
-          </a:xfrm>
-          <a:prstGeom prst="rect">
-            <a:avLst/>
-          </a:prstGeom>
-          <a:noFill/>
-          <a:ln w="9525">
-            <a:noFill/>
-            <a:miter lim="800000"/>
-            <a:headEnd/>
-            <a:tailEnd/>
-          </a:ln>
-        </p:spPr>
-      </p:pic>
-      <p:sp>
-        <p:nvSpPr>
-          <p:cNvPr id="7" name="Šrafovaná šipka doprava 6"/>
-          <p:cNvSpPr/>
-          <p:nvPr/>
-        </p:nvSpPr>
-        <p:spPr>
-          <a:xfrm rot="19359818">
-            <a:off x="3012318" y="3841206"/>
-            <a:ext cx="1812085" cy="1224136"/>
-          </a:xfrm>
-          <a:prstGeom prst="stripedRightArrow">
-            <a:avLst/>
-          </a:prstGeom>
-        </p:spPr>
-        <p:style>
-          <a:lnRef idx="2">
-            <a:schemeClr val="accent1">
-              <a:shade val="50000"/>
-            </a:schemeClr>
-          </a:lnRef>
-          <a:fillRef idx="1">
-            <a:schemeClr val="accent1"/>
-          </a:fillRef>
-          <a:effectRef idx="0">
-            <a:schemeClr val="accent1"/>
-          </a:effectRef>
-          <a:fontRef idx="minor">
-            <a:schemeClr val="lt1"/>
-          </a:fontRef>
-        </p:style>
-        <p:txBody>
-          <a:bodyPr rtlCol="0" anchor="ctr"/>
-          <a:lstStyle/>
-          <a:p>
-            <a:pPr algn="ctr"/>
-            <a:endParaRPr lang="cs-CZ"/>
-          </a:p>
-        </p:txBody>
-      </p:sp>
-    </p:spTree>
-  </p:cSld>
-  <p:clrMapOvr>
-    <a:masterClrMapping/>
-  </p:clrMapOvr>
+  <p:transition/>
+  <p:timing>
+    <p:tnLst>
+      <p:par>
+        <p:cTn id="1" dur="indefinite" restart="never" nodeType="tmRoot"/>
+      </p:par>
+    </p:tnLst>
+  </p:timing>
 </p:sld>
 </file>
 
@@ -5743,27 +6646,151 @@
             <p:ph type="title"/>
           </p:nvPr>
         </p:nvSpPr>
+        <p:spPr/>
+        <p:txBody>
+          <a:bodyPr/>
+          <a:lstStyle/>
+          <a:p>
+            <a:r>
+              <a:rPr lang="en-US" dirty="0" smtClean="0"/>
+              <a:t>Connectors</a:t>
+            </a:r>
+            <a:endParaRPr lang="cs-CZ" dirty="0"/>
+          </a:p>
+        </p:txBody>
+      </p:sp>
+      <p:sp>
+        <p:nvSpPr>
+          <p:cNvPr id="3" name="Zástupný symbol pro obsah 2"/>
+          <p:cNvSpPr>
+            <a:spLocks noGrp="1"/>
+          </p:cNvSpPr>
+          <p:nvPr>
+            <p:ph idx="1"/>
+          </p:nvPr>
+        </p:nvSpPr>
         <p:spPr>
           <a:xfrm>
-            <a:off x="2339752" y="274638"/>
-            <a:ext cx="6347048" cy="1143000"/>
-          </a:xfrm>
-        </p:spPr>
-        <p:txBody>
-          <a:bodyPr/>
-          <a:lstStyle/>
-          <a:p>
+            <a:off x="1979712" y="1600200"/>
+            <a:ext cx="6707088" cy="4525963"/>
+          </a:xfrm>
+        </p:spPr>
+        <p:txBody>
+          <a:bodyPr>
+            <a:normAutofit fontScale="85000" lnSpcReduction="20000"/>
+          </a:bodyPr>
+          <a:lstStyle/>
+          <a:p>
+            <a:pPr fontAlgn="t"/>
+            <a:r>
+              <a:rPr lang="cs-CZ" b="1" dirty="0" err="1" smtClean="0"/>
+              <a:t>Chemical</a:t>
+            </a:r>
+            <a:r>
+              <a:rPr lang="en-US" b="1" dirty="0" smtClean="0"/>
+              <a:t>Port </a:t>
+            </a:r>
+            <a:endParaRPr lang="cs-CZ" dirty="0" smtClean="0"/>
+          </a:p>
+          <a:p>
+            <a:pPr lvl="1" fontAlgn="t"/>
+            <a:r>
+              <a:rPr lang="cs-CZ" dirty="0" err="1" smtClean="0"/>
+              <a:t>molar</a:t>
+            </a:r>
+            <a:r>
+              <a:rPr lang="cs-CZ" dirty="0" smtClean="0"/>
+              <a:t> </a:t>
+            </a:r>
+            <a:r>
+              <a:rPr lang="cs-CZ" dirty="0" err="1" smtClean="0"/>
+              <a:t>concentration</a:t>
+            </a:r>
             <a:r>
               <a:rPr lang="en-US" dirty="0" smtClean="0"/>
-              <a:t>Chemical</a:t>
-            </a:r>
-            <a:endParaRPr lang="cs-CZ" dirty="0"/>
+              <a:t>,  </a:t>
+            </a:r>
+            <a:r>
+              <a:rPr lang="cs-CZ" dirty="0" err="1" smtClean="0"/>
+              <a:t>molar</a:t>
+            </a:r>
+            <a:r>
+              <a:rPr lang="cs-CZ" dirty="0" smtClean="0"/>
+              <a:t> </a:t>
+            </a:r>
+            <a:r>
+              <a:rPr lang="cs-CZ" dirty="0" err="1" smtClean="0"/>
+              <a:t>flow</a:t>
+            </a:r>
+            <a:endParaRPr lang="en-US" dirty="0" smtClean="0"/>
+          </a:p>
+          <a:p>
+            <a:pPr lvl="1" fontAlgn="t">
+              <a:buNone/>
+            </a:pPr>
+            <a:endParaRPr lang="cs-CZ" dirty="0" smtClean="0"/>
+          </a:p>
+          <a:p>
+            <a:r>
+              <a:rPr lang="en-US" b="1" dirty="0" err="1" smtClean="0"/>
+              <a:t>HydraulicPort</a:t>
+            </a:r>
+            <a:endParaRPr lang="en-US" dirty="0" smtClean="0"/>
+          </a:p>
+          <a:p>
+            <a:pPr lvl="1"/>
+            <a:r>
+              <a:rPr lang="en-US" dirty="0" smtClean="0"/>
+              <a:t>pressure, volumetric flow</a:t>
+            </a:r>
+          </a:p>
+          <a:p>
+            <a:pPr lvl="1">
+              <a:buNone/>
+            </a:pPr>
+            <a:endParaRPr lang="en-US" dirty="0" smtClean="0"/>
+          </a:p>
+          <a:p>
+            <a:r>
+              <a:rPr lang="en-US" b="1" dirty="0" err="1" smtClean="0"/>
+              <a:t>ThermalPort</a:t>
+            </a:r>
+            <a:endParaRPr lang="en-US" dirty="0" smtClean="0"/>
+          </a:p>
+          <a:p>
+            <a:pPr lvl="1"/>
+            <a:r>
+              <a:rPr lang="en-US" dirty="0" smtClean="0"/>
+              <a:t>temperature, heat flow</a:t>
+            </a:r>
+          </a:p>
+          <a:p>
+            <a:pPr lvl="1"/>
+            <a:endParaRPr lang="en-US" dirty="0" smtClean="0"/>
+          </a:p>
+          <a:p>
+            <a:r>
+              <a:rPr lang="en-US" b="1" dirty="0" err="1" smtClean="0"/>
+              <a:t>OsmoticPort</a:t>
+            </a:r>
+            <a:endParaRPr lang="en-US" dirty="0" smtClean="0"/>
+          </a:p>
+          <a:p>
+            <a:pPr lvl="1"/>
+            <a:r>
+              <a:rPr lang="en-US" dirty="0" err="1" smtClean="0"/>
+              <a:t>osmolarity</a:t>
+            </a:r>
+            <a:r>
+              <a:rPr lang="en-US" dirty="0" smtClean="0"/>
+              <a:t>, osmotic volumetric flow</a:t>
+            </a:r>
           </a:p>
         </p:txBody>
       </p:sp>
       <p:pic>
         <p:nvPicPr>
-          <p:cNvPr id="6147" name="Picture 3"/>
+          <p:cNvPr id="4101" name="Picture 5" descr="C:\Users\marek\Desktop\Modelica\Physiolibrary\Physiolibrary\Resources\Images\UserGuide\ChemicalPorts.png"/>
           <p:cNvPicPr>
             <a:picLocks noChangeAspect="1" noChangeArrowheads="1"/>
           </p:cNvPicPr>
@@ -5778,24 +6805,18 @@
         </p:blipFill>
         <p:spPr bwMode="auto">
           <a:xfrm>
-            <a:off x="179512" y="314325"/>
-            <a:ext cx="2981325" cy="6543675"/>
+            <a:off x="7482787" y="1844824"/>
+            <a:ext cx="905637" cy="432048"/>
           </a:xfrm>
           <a:prstGeom prst="rect">
             <a:avLst/>
           </a:prstGeom>
           <a:noFill/>
-          <a:ln w="9525">
-            <a:noFill/>
-            <a:miter lim="800000"/>
-            <a:headEnd/>
-            <a:tailEnd/>
-          </a:ln>
         </p:spPr>
       </p:pic>
       <p:pic>
         <p:nvPicPr>
-          <p:cNvPr id="6150" name="Picture 6"/>
+          <p:cNvPr id="4102" name="Picture 6" descr="C:\Users\marek\Desktop\Modelica\Physiolibrary\Physiolibrary\Resources\Images\UserGuide\OsmoticPorts.png"/>
           <p:cNvPicPr>
             <a:picLocks noChangeAspect="1" noChangeArrowheads="1"/>
           </p:cNvPicPr>
@@ -5810,64 +6831,18 @@
         </p:blipFill>
         <p:spPr bwMode="auto">
           <a:xfrm>
-            <a:off x="3907879" y="5517232"/>
-            <a:ext cx="3400425" cy="1133475"/>
+            <a:off x="7452321" y="5301209"/>
+            <a:ext cx="936103" cy="446582"/>
           </a:xfrm>
           <a:prstGeom prst="rect">
             <a:avLst/>
           </a:prstGeom>
           <a:noFill/>
-          <a:ln w="9525">
-            <a:noFill/>
-            <a:miter lim="800000"/>
-            <a:headEnd/>
-            <a:tailEnd/>
-          </a:ln>
         </p:spPr>
       </p:pic>
-      <p:sp>
-        <p:nvSpPr>
-          <p:cNvPr id="10" name="Šrafovaná šipka doprava 9"/>
-          <p:cNvSpPr/>
-          <p:nvPr/>
-        </p:nvSpPr>
-        <p:spPr>
-          <a:xfrm>
-            <a:off x="2339752" y="5949280"/>
-            <a:ext cx="1224136" cy="288032"/>
-          </a:xfrm>
-          <a:prstGeom prst="stripedRightArrow">
-            <a:avLst/>
-          </a:prstGeom>
-        </p:spPr>
-        <p:style>
-          <a:lnRef idx="2">
-            <a:schemeClr val="accent1">
-              <a:shade val="50000"/>
-            </a:schemeClr>
-          </a:lnRef>
-          <a:fillRef idx="1">
-            <a:schemeClr val="accent1"/>
-          </a:fillRef>
-          <a:effectRef idx="0">
-            <a:schemeClr val="accent1"/>
-          </a:effectRef>
-          <a:fontRef idx="minor">
-            <a:schemeClr val="lt1"/>
-          </a:fontRef>
-        </p:style>
-        <p:txBody>
-          <a:bodyPr rtlCol="0" anchor="ctr"/>
-          <a:lstStyle/>
-          <a:p>
-            <a:pPr algn="ctr"/>
-            <a:endParaRPr lang="cs-CZ"/>
-          </a:p>
-        </p:txBody>
-      </p:sp>
       <p:pic>
         <p:nvPicPr>
-          <p:cNvPr id="6151" name="Picture 7"/>
+          <p:cNvPr id="4103" name="Picture 7" descr="C:\Users\marek\Desktop\Modelica\Physiolibrary\Physiolibrary\Resources\Images\UserGuide\HydraulicPorts.png"/>
           <p:cNvPicPr>
             <a:picLocks noChangeAspect="1" noChangeArrowheads="1"/>
           </p:cNvPicPr>
@@ -5882,8 +6857,60 @@
         </p:blipFill>
         <p:spPr bwMode="auto">
           <a:xfrm>
-            <a:off x="3995936" y="1700808"/>
-            <a:ext cx="4295775" cy="2066925"/>
+            <a:off x="7452320" y="2924944"/>
+            <a:ext cx="1023153" cy="504056"/>
+          </a:xfrm>
+          <a:prstGeom prst="rect">
+            <a:avLst/>
+          </a:prstGeom>
+          <a:noFill/>
+        </p:spPr>
+      </p:pic>
+      <p:pic>
+        <p:nvPicPr>
+          <p:cNvPr id="4104" name="Picture 8" descr="C:\Users\marek\Desktop\Modelica\Physiolibrary\Physiolibrary\Resources\Images\UserGuide\ThermalPorts.png"/>
+          <p:cNvPicPr>
+            <a:picLocks noChangeAspect="1" noChangeArrowheads="1"/>
+          </p:cNvPicPr>
+          <p:nvPr/>
+        </p:nvPicPr>
+        <p:blipFill>
+          <a:blip r:embed="rId5" cstate="print"/>
+          <a:srcRect/>
+          <a:stretch>
+            <a:fillRect/>
+          </a:stretch>
+        </p:blipFill>
+        <p:spPr bwMode="auto">
+          <a:xfrm>
+            <a:off x="7452320" y="4149080"/>
+            <a:ext cx="936104" cy="446583"/>
+          </a:xfrm>
+          <a:prstGeom prst="rect">
+            <a:avLst/>
+          </a:prstGeom>
+          <a:noFill/>
+        </p:spPr>
+      </p:pic>
+      <p:pic>
+        <p:nvPicPr>
+          <p:cNvPr id="1027" name="Picture 3"/>
+          <p:cNvPicPr>
+            <a:picLocks noChangeAspect="1" noChangeArrowheads="1"/>
+          </p:cNvPicPr>
+          <p:nvPr/>
+        </p:nvPicPr>
+        <p:blipFill>
+          <a:blip r:embed="rId6" cstate="print"/>
+          <a:srcRect/>
+          <a:stretch>
+            <a:fillRect/>
+          </a:stretch>
+        </p:blipFill>
+        <p:spPr bwMode="auto">
+          <a:xfrm>
+            <a:off x="251520" y="741809"/>
+            <a:ext cx="1666875" cy="2543175"/>
           </a:xfrm>
           <a:prstGeom prst="rect">
             <a:avLst/>
@@ -5897,91 +6924,18 @@
           </a:ln>
         </p:spPr>
       </p:pic>
-      <p:sp>
-        <p:nvSpPr>
-          <p:cNvPr id="12" name="Šrafovaná šipka doprava 11"/>
-          <p:cNvSpPr/>
-          <p:nvPr/>
-        </p:nvSpPr>
-        <p:spPr>
-          <a:xfrm rot="522209">
-            <a:off x="2306259" y="1495598"/>
-            <a:ext cx="4914222" cy="166500"/>
-          </a:xfrm>
-          <a:prstGeom prst="stripedRightArrow">
-            <a:avLst/>
-          </a:prstGeom>
-        </p:spPr>
-        <p:style>
-          <a:lnRef idx="2">
-            <a:schemeClr val="accent1">
-              <a:shade val="50000"/>
-            </a:schemeClr>
-          </a:lnRef>
-          <a:fillRef idx="1">
-            <a:schemeClr val="accent1"/>
-          </a:fillRef>
-          <a:effectRef idx="0">
-            <a:schemeClr val="accent1"/>
-          </a:effectRef>
-          <a:fontRef idx="minor">
-            <a:schemeClr val="lt1"/>
-          </a:fontRef>
-        </p:style>
-        <p:txBody>
-          <a:bodyPr rtlCol="0" anchor="ctr"/>
-          <a:lstStyle/>
-          <a:p>
-            <a:pPr algn="ctr"/>
-            <a:endParaRPr lang="cs-CZ"/>
-          </a:p>
-        </p:txBody>
-      </p:sp>
-      <p:sp>
-        <p:nvSpPr>
-          <p:cNvPr id="14" name="Šrafovaná šipka doprava 13"/>
-          <p:cNvSpPr/>
-          <p:nvPr/>
-        </p:nvSpPr>
-        <p:spPr>
-          <a:xfrm rot="1573652">
-            <a:off x="2258777" y="2080958"/>
-            <a:ext cx="3390709" cy="175804"/>
-          </a:xfrm>
-          <a:prstGeom prst="stripedRightArrow">
-            <a:avLst/>
-          </a:prstGeom>
-        </p:spPr>
-        <p:style>
-          <a:lnRef idx="2">
-            <a:schemeClr val="accent1">
-              <a:shade val="50000"/>
-            </a:schemeClr>
-          </a:lnRef>
-          <a:fillRef idx="1">
-            <a:schemeClr val="accent1"/>
-          </a:fillRef>
-          <a:effectRef idx="0">
-            <a:schemeClr val="accent1"/>
-          </a:effectRef>
-          <a:fontRef idx="minor">
-            <a:schemeClr val="lt1"/>
-          </a:fontRef>
-        </p:style>
-        <p:txBody>
-          <a:bodyPr rtlCol="0" anchor="ctr"/>
-          <a:lstStyle/>
-          <a:p>
-            <a:pPr algn="ctr"/>
-            <a:endParaRPr lang="cs-CZ"/>
-          </a:p>
-        </p:txBody>
-      </p:sp>
     </p:spTree>
   </p:cSld>
   <p:clrMapOvr>
     <a:masterClrMapping/>
   </p:clrMapOvr>
+  <p:timing>
+    <p:tnLst>
+      <p:par>
+        <p:cTn id="1" dur="indefinite" restart="never" nodeType="tmRoot"/>
+      </p:par>
+    </p:tnLst>
+  </p:timing>
 </p:sld>
 </file>
 
@@ -6002,9 +6956,37 @@
           <a:chExt cx="0" cy="0"/>
         </a:xfrm>
       </p:grpSpPr>
+      <p:sp>
+        <p:nvSpPr>
+          <p:cNvPr id="2" name="Nadpis 1"/>
+          <p:cNvSpPr>
+            <a:spLocks noGrp="1"/>
+          </p:cNvSpPr>
+          <p:nvPr>
+            <p:ph type="title"/>
+          </p:nvPr>
+        </p:nvSpPr>
+        <p:spPr>
+          <a:xfrm>
+            <a:off x="2339752" y="274638"/>
+            <a:ext cx="6347048" cy="1143000"/>
+          </a:xfrm>
+        </p:spPr>
+        <p:txBody>
+          <a:bodyPr/>
+          <a:lstStyle/>
+          <a:p>
+            <a:r>
+              <a:rPr lang="en-US" dirty="0" smtClean="0"/>
+              <a:t>Chemical</a:t>
+            </a:r>
+            <a:endParaRPr lang="cs-CZ" dirty="0"/>
+          </a:p>
+        </p:txBody>
+      </p:sp>
       <p:pic>
         <p:nvPicPr>
-          <p:cNvPr id="7181" name="Picture 13"/>
+          <p:cNvPr id="6147" name="Picture 3"/>
           <p:cNvPicPr>
             <a:picLocks noChangeAspect="1" noChangeArrowheads="1"/>
           </p:cNvPicPr>
@@ -6019,8 +7001,8 @@
         </p:blipFill>
         <p:spPr bwMode="auto">
           <a:xfrm>
-            <a:off x="7596336" y="1432570"/>
-            <a:ext cx="1257300" cy="1276350"/>
+            <a:off x="179512" y="314325"/>
+            <a:ext cx="2981325" cy="6543675"/>
           </a:xfrm>
           <a:prstGeom prst="rect">
             <a:avLst/>
@@ -6034,32 +7016,9 @@
           </a:ln>
         </p:spPr>
       </p:pic>
-      <p:sp>
-        <p:nvSpPr>
-          <p:cNvPr id="2" name="Nadpis 1"/>
-          <p:cNvSpPr>
-            <a:spLocks noGrp="1"/>
-          </p:cNvSpPr>
-          <p:nvPr>
-            <p:ph type="title"/>
-          </p:nvPr>
-        </p:nvSpPr>
-        <p:spPr/>
-        <p:txBody>
-          <a:bodyPr/>
-          <a:lstStyle/>
-          <a:p>
-            <a:r>
-              <a:rPr lang="en-US" dirty="0" smtClean="0"/>
-              <a:t>CONDITIONAL INPUTS</a:t>
-            </a:r>
-            <a:endParaRPr lang="cs-CZ" dirty="0"/>
-          </a:p>
-        </p:txBody>
-      </p:sp>
       <p:pic>
         <p:nvPicPr>
-          <p:cNvPr id="7170" name="Picture 2"/>
+          <p:cNvPr id="6150" name="Picture 6"/>
           <p:cNvPicPr>
             <a:picLocks noChangeAspect="1" noChangeArrowheads="1"/>
           </p:cNvPicPr>
@@ -6074,8 +7033,8 @@
         </p:blipFill>
         <p:spPr bwMode="auto">
           <a:xfrm>
-            <a:off x="2972941" y="1490861"/>
-            <a:ext cx="1743075" cy="1362075"/>
+            <a:off x="3907879" y="5517232"/>
+            <a:ext cx="3400425" cy="1133475"/>
           </a:xfrm>
           <a:prstGeom prst="rect">
             <a:avLst/>
@@ -6089,80 +7048,16 @@
           </a:ln>
         </p:spPr>
       </p:pic>
-      <p:pic>
-        <p:nvPicPr>
-          <p:cNvPr id="7173" name="Picture 5"/>
-          <p:cNvPicPr>
-            <a:picLocks noChangeAspect="1" noChangeArrowheads="1"/>
-          </p:cNvPicPr>
-          <p:nvPr/>
-        </p:nvPicPr>
-        <p:blipFill>
-          <a:blip r:embed="rId4" cstate="print"/>
-          <a:srcRect/>
-          <a:stretch>
-            <a:fillRect/>
-          </a:stretch>
-        </p:blipFill>
-        <p:spPr bwMode="auto">
-          <a:xfrm>
-            <a:off x="345157" y="1556792"/>
-            <a:ext cx="2438400" cy="723900"/>
-          </a:xfrm>
-          <a:prstGeom prst="rect">
-            <a:avLst/>
-          </a:prstGeom>
-          <a:noFill/>
-          <a:ln w="9525">
-            <a:noFill/>
-            <a:miter lim="800000"/>
-            <a:headEnd/>
-            <a:tailEnd/>
-          </a:ln>
-        </p:spPr>
-      </p:pic>
-      <p:pic>
-        <p:nvPicPr>
-          <p:cNvPr id="7176" name="Picture 8"/>
-          <p:cNvPicPr>
-            <a:picLocks noChangeAspect="1" noChangeArrowheads="1"/>
-          </p:cNvPicPr>
-          <p:nvPr/>
-        </p:nvPicPr>
-        <p:blipFill>
-          <a:blip r:embed="rId5" cstate="print"/>
-          <a:srcRect/>
-          <a:stretch>
-            <a:fillRect/>
-          </a:stretch>
-        </p:blipFill>
-        <p:spPr bwMode="auto">
-          <a:xfrm>
-            <a:off x="4644008" y="1556792"/>
-            <a:ext cx="2647950" cy="733425"/>
-          </a:xfrm>
-          <a:prstGeom prst="rect">
-            <a:avLst/>
-          </a:prstGeom>
-          <a:noFill/>
-          <a:ln w="9525">
-            <a:noFill/>
-            <a:miter lim="800000"/>
-            <a:headEnd/>
-            <a:tailEnd/>
-          </a:ln>
-        </p:spPr>
-      </p:pic>
-      <p:sp>
-        <p:nvSpPr>
-          <p:cNvPr id="11" name="Šrafovaná šipka doprava 10"/>
+      <p:sp>
+        <p:nvSpPr>
+          <p:cNvPr id="10" name="Šrafovaná šipka doprava 9"/>
           <p:cNvSpPr/>
           <p:nvPr/>
         </p:nvSpPr>
         <p:spPr>
           <a:xfrm>
-            <a:off x="2684909" y="1772816"/>
-            <a:ext cx="576064" cy="432048"/>
+            <a:off x="2339752" y="5949280"/>
+            <a:ext cx="1224136" cy="288032"/>
           </a:xfrm>
           <a:prstGeom prst="stripedRightArrow">
             <a:avLst/>
@@ -6195,14 +7090,14 @@
       </p:sp>
       <p:pic>
         <p:nvPicPr>
-          <p:cNvPr id="7177" name="Picture 9"/>
+          <p:cNvPr id="6151" name="Picture 7"/>
           <p:cNvPicPr>
             <a:picLocks noChangeAspect="1" noChangeArrowheads="1"/>
           </p:cNvPicPr>
           <p:nvPr/>
         </p:nvPicPr>
         <p:blipFill>
-          <a:blip r:embed="rId6" cstate="print"/>
+          <a:blip r:embed="rId4" cstate="print"/>
           <a:srcRect/>
           <a:stretch>
             <a:fillRect/>
@@ -6210,8 +7105,8 @@
         </p:blipFill>
         <p:spPr bwMode="auto">
           <a:xfrm>
-            <a:off x="323528" y="3509392"/>
-            <a:ext cx="3705225" cy="1609725"/>
+            <a:off x="3995936" y="1700808"/>
+            <a:ext cx="4295775" cy="2066925"/>
           </a:xfrm>
           <a:prstGeom prst="rect">
             <a:avLst/>
@@ -6227,14 +7122,14 @@
       </p:pic>
       <p:sp>
         <p:nvSpPr>
-          <p:cNvPr id="14" name="Šrafovaná šipka doprava 13"/>
+          <p:cNvPr id="12" name="Šrafovaná šipka doprava 11"/>
           <p:cNvSpPr/>
           <p:nvPr/>
         </p:nvSpPr>
         <p:spPr>
-          <a:xfrm>
-            <a:off x="7020272" y="1772816"/>
-            <a:ext cx="576064" cy="432048"/>
+          <a:xfrm rot="522209">
+            <a:off x="2306259" y="1495598"/>
+            <a:ext cx="4914222" cy="166500"/>
           </a:xfrm>
           <a:prstGeom prst="stripedRightArrow">
             <a:avLst/>
@@ -6265,112 +7160,16 @@
           </a:p>
         </p:txBody>
       </p:sp>
-      <p:pic>
-        <p:nvPicPr>
-          <p:cNvPr id="7178" name="Picture 10"/>
-          <p:cNvPicPr>
-            <a:picLocks noChangeAspect="1" noChangeArrowheads="1"/>
-          </p:cNvPicPr>
-          <p:nvPr/>
-        </p:nvPicPr>
-        <p:blipFill>
-          <a:blip r:embed="rId7" cstate="print"/>
-          <a:srcRect/>
-          <a:stretch>
-            <a:fillRect/>
-          </a:stretch>
-        </p:blipFill>
-        <p:spPr bwMode="auto">
-          <a:xfrm>
-            <a:off x="4716016" y="3501008"/>
-            <a:ext cx="3676650" cy="1762125"/>
-          </a:xfrm>
-          <a:prstGeom prst="rect">
-            <a:avLst/>
-          </a:prstGeom>
-          <a:noFill/>
-          <a:ln w="9525">
-            <a:noFill/>
-            <a:miter lim="800000"/>
-            <a:headEnd/>
-            <a:tailEnd/>
-          </a:ln>
-        </p:spPr>
-      </p:pic>
-      <p:pic>
-        <p:nvPicPr>
-          <p:cNvPr id="7179" name="Picture 11"/>
-          <p:cNvPicPr>
-            <a:picLocks noChangeAspect="1" noChangeArrowheads="1"/>
-          </p:cNvPicPr>
-          <p:nvPr/>
-        </p:nvPicPr>
-        <p:blipFill>
-          <a:blip r:embed="rId8" cstate="print"/>
-          <a:srcRect/>
-          <a:stretch>
-            <a:fillRect/>
-          </a:stretch>
-        </p:blipFill>
-        <p:spPr bwMode="auto">
-          <a:xfrm>
-            <a:off x="5076056" y="5445224"/>
-            <a:ext cx="2362200" cy="771525"/>
-          </a:xfrm>
-          <a:prstGeom prst="rect">
-            <a:avLst/>
-          </a:prstGeom>
-          <a:noFill/>
-          <a:ln w="9525">
-            <a:noFill/>
-            <a:miter lim="800000"/>
-            <a:headEnd/>
-            <a:tailEnd/>
-          </a:ln>
-        </p:spPr>
-      </p:pic>
-      <p:pic>
-        <p:nvPicPr>
-          <p:cNvPr id="7180" name="Picture 12"/>
-          <p:cNvPicPr>
-            <a:picLocks noChangeAspect="1" noChangeArrowheads="1"/>
-          </p:cNvPicPr>
-          <p:nvPr/>
-        </p:nvPicPr>
-        <p:blipFill>
-          <a:blip r:embed="rId9" cstate="print"/>
-          <a:srcRect/>
-          <a:stretch>
-            <a:fillRect/>
-          </a:stretch>
-        </p:blipFill>
-        <p:spPr bwMode="auto">
-          <a:xfrm>
-            <a:off x="1547664" y="5805264"/>
-            <a:ext cx="1943100" cy="457200"/>
-          </a:xfrm>
-          <a:prstGeom prst="rect">
-            <a:avLst/>
-          </a:prstGeom>
-          <a:noFill/>
-          <a:ln w="9525">
-            <a:noFill/>
-            <a:miter lim="800000"/>
-            <a:headEnd/>
-            <a:tailEnd/>
-          </a:ln>
-        </p:spPr>
-      </p:pic>
-      <p:sp>
-        <p:nvSpPr>
-          <p:cNvPr id="18" name="Šrafovaná šipka doprava 17"/>
+      <p:sp>
+        <p:nvSpPr>
+          <p:cNvPr id="14" name="Šrafovaná šipka doprava 13"/>
           <p:cNvSpPr/>
           <p:nvPr/>
         </p:nvSpPr>
         <p:spPr>
-          <a:xfrm rot="5400000">
-            <a:off x="2195736" y="5229200"/>
-            <a:ext cx="576064" cy="432048"/>
+          <a:xfrm rot="1573652">
+            <a:off x="2258777" y="2080958"/>
+            <a:ext cx="3390709" cy="175804"/>
           </a:xfrm>
           <a:prstGeom prst="stripedRightArrow">
             <a:avLst/>
@@ -6401,121 +7200,18 @@
           </a:p>
         </p:txBody>
       </p:sp>
-      <p:sp>
-        <p:nvSpPr>
-          <p:cNvPr id="19" name="Šrafovaná šipka doprava 18"/>
-          <p:cNvSpPr/>
-          <p:nvPr/>
-        </p:nvSpPr>
-        <p:spPr>
-          <a:xfrm rot="5400000">
-            <a:off x="6624228" y="5193196"/>
-            <a:ext cx="504056" cy="432048"/>
-          </a:xfrm>
-          <a:prstGeom prst="stripedRightArrow">
-            <a:avLst/>
-          </a:prstGeom>
-        </p:spPr>
-        <p:style>
-          <a:lnRef idx="2">
-            <a:schemeClr val="accent1">
-              <a:shade val="50000"/>
-            </a:schemeClr>
-          </a:lnRef>
-          <a:fillRef idx="1">
-            <a:schemeClr val="accent1"/>
-          </a:fillRef>
-          <a:effectRef idx="0">
-            <a:schemeClr val="accent1"/>
-          </a:effectRef>
-          <a:fontRef idx="minor">
-            <a:schemeClr val="lt1"/>
-          </a:fontRef>
-        </p:style>
-        <p:txBody>
-          <a:bodyPr rtlCol="0" anchor="ctr"/>
-          <a:lstStyle/>
-          <a:p>
-            <a:pPr algn="ctr"/>
-            <a:endParaRPr lang="cs-CZ"/>
-          </a:p>
-        </p:txBody>
-      </p:sp>
-      <p:cxnSp>
-        <p:nvCxnSpPr>
-          <p:cNvPr id="22" name="Přímá spojovací čára 21"/>
-          <p:cNvCxnSpPr/>
-          <p:nvPr/>
-        </p:nvCxnSpPr>
-        <p:spPr>
-          <a:xfrm>
-            <a:off x="251520" y="3068960"/>
-            <a:ext cx="8712968" cy="0"/>
-          </a:xfrm>
-          <a:prstGeom prst="line">
-            <a:avLst/>
-          </a:prstGeom>
-        </p:spPr>
-        <p:style>
-          <a:lnRef idx="1">
-            <a:schemeClr val="accent1"/>
-          </a:lnRef>
-          <a:fillRef idx="0">
-            <a:schemeClr val="accent1"/>
-          </a:fillRef>
-          <a:effectRef idx="0">
-            <a:schemeClr val="accent1"/>
-          </a:effectRef>
-          <a:fontRef idx="minor">
-            <a:schemeClr val="tx1"/>
-          </a:fontRef>
-        </p:style>
-      </p:cxnSp>
-      <p:sp>
-        <p:nvSpPr>
-          <p:cNvPr id="23" name="Šrafovaná šipka doprava 22"/>
-          <p:cNvSpPr/>
-          <p:nvPr/>
-        </p:nvSpPr>
-        <p:spPr>
-          <a:xfrm rot="18023328">
-            <a:off x="6835589" y="4402446"/>
-            <a:ext cx="464368" cy="285358"/>
-          </a:xfrm>
-          <a:prstGeom prst="stripedRightArrow">
-            <a:avLst/>
-          </a:prstGeom>
-        </p:spPr>
-        <p:style>
-          <a:lnRef idx="2">
-            <a:schemeClr val="accent1">
-              <a:shade val="50000"/>
-            </a:schemeClr>
-          </a:lnRef>
-          <a:fillRef idx="1">
-            <a:schemeClr val="accent1"/>
-          </a:fillRef>
-          <a:effectRef idx="0">
-            <a:schemeClr val="accent1"/>
-          </a:effectRef>
-          <a:fontRef idx="minor">
-            <a:schemeClr val="lt1"/>
-          </a:fontRef>
-        </p:style>
-        <p:txBody>
-          <a:bodyPr rtlCol="0" anchor="ctr"/>
-          <a:lstStyle/>
-          <a:p>
-            <a:pPr algn="r"/>
-            <a:endParaRPr lang="cs-CZ" dirty="0"/>
-          </a:p>
-        </p:txBody>
-      </p:sp>
     </p:spTree>
   </p:cSld>
   <p:clrMapOvr>
     <a:masterClrMapping/>
   </p:clrMapOvr>
+  <p:timing>
+    <p:tnLst>
+      <p:par>
+        <p:cTn id="1" dur="indefinite" restart="never" nodeType="tmRoot"/>
+      </p:par>
+    </p:tnLst>
+  </p:timing>
 </p:sld>
 </file>
 

</xml_diff>